<commit_message>
ppt edited and pdf added
</commit_message>
<xml_diff>
--- a/presentation.pptx
+++ b/presentation.pptx
@@ -858,6 +858,753 @@
 </dgm:colorsDef>
 </file>
 
+<file path=ppt/diagrams/colors2.xml><?xml version="1.0" encoding="utf-8"?>
+<dgm:colorsDef xmlns:dgm="http://schemas.openxmlformats.org/drawingml/2006/diagram" xmlns:a="http://schemas.openxmlformats.org/drawingml/2006/main" uniqueId="urn:microsoft.com/office/officeart/2005/8/colors/accent1_2">
+  <dgm:title val=""/>
+  <dgm:desc val=""/>
+  <dgm:catLst>
+    <dgm:cat type="accent1" pri="11200"/>
+  </dgm:catLst>
+  <dgm:styleLbl name="node0">
+    <dgm:fillClrLst meth="repeat">
+      <a:schemeClr val="accent1"/>
+    </dgm:fillClrLst>
+    <dgm:linClrLst meth="repeat">
+      <a:schemeClr val="lt1"/>
+    </dgm:linClrLst>
+    <dgm:effectClrLst/>
+    <dgm:txLinClrLst/>
+    <dgm:txFillClrLst/>
+    <dgm:txEffectClrLst/>
+  </dgm:styleLbl>
+  <dgm:styleLbl name="alignNode1">
+    <dgm:fillClrLst meth="repeat">
+      <a:schemeClr val="accent1"/>
+    </dgm:fillClrLst>
+    <dgm:linClrLst meth="repeat">
+      <a:schemeClr val="accent1"/>
+    </dgm:linClrLst>
+    <dgm:effectClrLst/>
+    <dgm:txLinClrLst/>
+    <dgm:txFillClrLst/>
+    <dgm:txEffectClrLst/>
+  </dgm:styleLbl>
+  <dgm:styleLbl name="node1">
+    <dgm:fillClrLst meth="repeat">
+      <a:schemeClr val="accent1"/>
+    </dgm:fillClrLst>
+    <dgm:linClrLst meth="repeat">
+      <a:schemeClr val="lt1"/>
+    </dgm:linClrLst>
+    <dgm:effectClrLst/>
+    <dgm:txLinClrLst/>
+    <dgm:txFillClrLst/>
+    <dgm:txEffectClrLst/>
+  </dgm:styleLbl>
+  <dgm:styleLbl name="lnNode1">
+    <dgm:fillClrLst meth="repeat">
+      <a:schemeClr val="accent1"/>
+    </dgm:fillClrLst>
+    <dgm:linClrLst meth="repeat">
+      <a:schemeClr val="lt1"/>
+    </dgm:linClrLst>
+    <dgm:effectClrLst/>
+    <dgm:txLinClrLst/>
+    <dgm:txFillClrLst/>
+    <dgm:txEffectClrLst/>
+  </dgm:styleLbl>
+  <dgm:styleLbl name="vennNode1">
+    <dgm:fillClrLst meth="repeat">
+      <a:schemeClr val="accent1">
+        <a:alpha val="50000"/>
+      </a:schemeClr>
+    </dgm:fillClrLst>
+    <dgm:linClrLst meth="repeat">
+      <a:schemeClr val="lt1"/>
+    </dgm:linClrLst>
+    <dgm:effectClrLst/>
+    <dgm:txLinClrLst/>
+    <dgm:txFillClrLst/>
+    <dgm:txEffectClrLst/>
+  </dgm:styleLbl>
+  <dgm:styleLbl name="node2">
+    <dgm:fillClrLst meth="repeat">
+      <a:schemeClr val="accent1"/>
+    </dgm:fillClrLst>
+    <dgm:linClrLst meth="repeat">
+      <a:schemeClr val="lt1"/>
+    </dgm:linClrLst>
+    <dgm:effectClrLst/>
+    <dgm:txLinClrLst/>
+    <dgm:txFillClrLst/>
+    <dgm:txEffectClrLst/>
+  </dgm:styleLbl>
+  <dgm:styleLbl name="node3">
+    <dgm:fillClrLst meth="repeat">
+      <a:schemeClr val="accent1"/>
+    </dgm:fillClrLst>
+    <dgm:linClrLst meth="repeat">
+      <a:schemeClr val="lt1"/>
+    </dgm:linClrLst>
+    <dgm:effectClrLst/>
+    <dgm:txLinClrLst/>
+    <dgm:txFillClrLst/>
+    <dgm:txEffectClrLst/>
+  </dgm:styleLbl>
+  <dgm:styleLbl name="node4">
+    <dgm:fillClrLst meth="repeat">
+      <a:schemeClr val="accent1"/>
+    </dgm:fillClrLst>
+    <dgm:linClrLst meth="repeat">
+      <a:schemeClr val="lt1"/>
+    </dgm:linClrLst>
+    <dgm:effectClrLst/>
+    <dgm:txLinClrLst/>
+    <dgm:txFillClrLst/>
+    <dgm:txEffectClrLst/>
+  </dgm:styleLbl>
+  <dgm:styleLbl name="fgImgPlace1">
+    <dgm:fillClrLst meth="repeat">
+      <a:schemeClr val="accent1">
+        <a:tint val="50000"/>
+      </a:schemeClr>
+    </dgm:fillClrLst>
+    <dgm:linClrLst meth="repeat">
+      <a:schemeClr val="lt1"/>
+    </dgm:linClrLst>
+    <dgm:effectClrLst/>
+    <dgm:txLinClrLst/>
+    <dgm:txFillClrLst meth="repeat">
+      <a:schemeClr val="lt1"/>
+    </dgm:txFillClrLst>
+    <dgm:txEffectClrLst/>
+  </dgm:styleLbl>
+  <dgm:styleLbl name="alignImgPlace1">
+    <dgm:fillClrLst meth="repeat">
+      <a:schemeClr val="accent1">
+        <a:tint val="50000"/>
+      </a:schemeClr>
+    </dgm:fillClrLst>
+    <dgm:linClrLst meth="repeat">
+      <a:schemeClr val="lt1"/>
+    </dgm:linClrLst>
+    <dgm:effectClrLst/>
+    <dgm:txLinClrLst/>
+    <dgm:txFillClrLst meth="repeat">
+      <a:schemeClr val="lt1"/>
+    </dgm:txFillClrLst>
+    <dgm:txEffectClrLst/>
+  </dgm:styleLbl>
+  <dgm:styleLbl name="bgImgPlace1">
+    <dgm:fillClrLst meth="repeat">
+      <a:schemeClr val="accent1">
+        <a:tint val="50000"/>
+      </a:schemeClr>
+    </dgm:fillClrLst>
+    <dgm:linClrLst meth="repeat">
+      <a:schemeClr val="lt1"/>
+    </dgm:linClrLst>
+    <dgm:effectClrLst/>
+    <dgm:txLinClrLst/>
+    <dgm:txFillClrLst meth="repeat">
+      <a:schemeClr val="lt1"/>
+    </dgm:txFillClrLst>
+    <dgm:txEffectClrLst/>
+  </dgm:styleLbl>
+  <dgm:styleLbl name="sibTrans2D1">
+    <dgm:fillClrLst meth="repeat">
+      <a:schemeClr val="accent1">
+        <a:tint val="60000"/>
+      </a:schemeClr>
+    </dgm:fillClrLst>
+    <dgm:linClrLst meth="repeat">
+      <a:schemeClr val="accent1">
+        <a:tint val="60000"/>
+      </a:schemeClr>
+    </dgm:linClrLst>
+    <dgm:effectClrLst/>
+    <dgm:txLinClrLst/>
+    <dgm:txFillClrLst/>
+    <dgm:txEffectClrLst/>
+  </dgm:styleLbl>
+  <dgm:styleLbl name="fgSibTrans2D1">
+    <dgm:fillClrLst meth="repeat">
+      <a:schemeClr val="accent1">
+        <a:tint val="60000"/>
+      </a:schemeClr>
+    </dgm:fillClrLst>
+    <dgm:linClrLst meth="repeat">
+      <a:schemeClr val="accent1">
+        <a:tint val="60000"/>
+      </a:schemeClr>
+    </dgm:linClrLst>
+    <dgm:effectClrLst/>
+    <dgm:txLinClrLst/>
+    <dgm:txFillClrLst/>
+    <dgm:txEffectClrLst/>
+  </dgm:styleLbl>
+  <dgm:styleLbl name="bgSibTrans2D1">
+    <dgm:fillClrLst meth="repeat">
+      <a:schemeClr val="accent1">
+        <a:tint val="60000"/>
+      </a:schemeClr>
+    </dgm:fillClrLst>
+    <dgm:linClrLst meth="repeat">
+      <a:schemeClr val="accent1">
+        <a:tint val="60000"/>
+      </a:schemeClr>
+    </dgm:linClrLst>
+    <dgm:effectClrLst/>
+    <dgm:txLinClrLst/>
+    <dgm:txFillClrLst/>
+    <dgm:txEffectClrLst/>
+  </dgm:styleLbl>
+  <dgm:styleLbl name="sibTrans1D1">
+    <dgm:fillClrLst meth="repeat">
+      <a:schemeClr val="accent1"/>
+    </dgm:fillClrLst>
+    <dgm:linClrLst meth="repeat">
+      <a:schemeClr val="accent1"/>
+    </dgm:linClrLst>
+    <dgm:effectClrLst/>
+    <dgm:txLinClrLst/>
+    <dgm:txFillClrLst meth="repeat">
+      <a:schemeClr val="tx1"/>
+    </dgm:txFillClrLst>
+    <dgm:txEffectClrLst/>
+  </dgm:styleLbl>
+  <dgm:styleLbl name="callout">
+    <dgm:fillClrLst meth="repeat">
+      <a:schemeClr val="accent1"/>
+    </dgm:fillClrLst>
+    <dgm:linClrLst meth="repeat">
+      <a:schemeClr val="accent1">
+        <a:tint val="50000"/>
+      </a:schemeClr>
+    </dgm:linClrLst>
+    <dgm:effectClrLst/>
+    <dgm:txLinClrLst/>
+    <dgm:txFillClrLst meth="repeat">
+      <a:schemeClr val="tx1"/>
+    </dgm:txFillClrLst>
+    <dgm:txEffectClrLst/>
+  </dgm:styleLbl>
+  <dgm:styleLbl name="asst0">
+    <dgm:fillClrLst meth="repeat">
+      <a:schemeClr val="accent1"/>
+    </dgm:fillClrLst>
+    <dgm:linClrLst meth="repeat">
+      <a:schemeClr val="lt1"/>
+    </dgm:linClrLst>
+    <dgm:effectClrLst/>
+    <dgm:txLinClrLst/>
+    <dgm:txFillClrLst/>
+    <dgm:txEffectClrLst/>
+  </dgm:styleLbl>
+  <dgm:styleLbl name="asst1">
+    <dgm:fillClrLst meth="repeat">
+      <a:schemeClr val="accent1"/>
+    </dgm:fillClrLst>
+    <dgm:linClrLst meth="repeat">
+      <a:schemeClr val="lt1"/>
+    </dgm:linClrLst>
+    <dgm:effectClrLst/>
+    <dgm:txLinClrLst/>
+    <dgm:txFillClrLst/>
+    <dgm:txEffectClrLst/>
+  </dgm:styleLbl>
+  <dgm:styleLbl name="asst2">
+    <dgm:fillClrLst meth="repeat">
+      <a:schemeClr val="accent1"/>
+    </dgm:fillClrLst>
+    <dgm:linClrLst meth="repeat">
+      <a:schemeClr val="lt1"/>
+    </dgm:linClrLst>
+    <dgm:effectClrLst/>
+    <dgm:txLinClrLst/>
+    <dgm:txFillClrLst/>
+    <dgm:txEffectClrLst/>
+  </dgm:styleLbl>
+  <dgm:styleLbl name="asst3">
+    <dgm:fillClrLst meth="repeat">
+      <a:schemeClr val="accent1"/>
+    </dgm:fillClrLst>
+    <dgm:linClrLst meth="repeat">
+      <a:schemeClr val="lt1"/>
+    </dgm:linClrLst>
+    <dgm:effectClrLst/>
+    <dgm:txLinClrLst/>
+    <dgm:txFillClrLst/>
+    <dgm:txEffectClrLst/>
+  </dgm:styleLbl>
+  <dgm:styleLbl name="asst4">
+    <dgm:fillClrLst meth="repeat">
+      <a:schemeClr val="accent1"/>
+    </dgm:fillClrLst>
+    <dgm:linClrLst meth="repeat">
+      <a:schemeClr val="lt1"/>
+    </dgm:linClrLst>
+    <dgm:effectClrLst/>
+    <dgm:txLinClrLst/>
+    <dgm:txFillClrLst/>
+    <dgm:txEffectClrLst/>
+  </dgm:styleLbl>
+  <dgm:styleLbl name="parChTrans2D1">
+    <dgm:fillClrLst meth="repeat">
+      <a:schemeClr val="accent1">
+        <a:tint val="60000"/>
+      </a:schemeClr>
+    </dgm:fillClrLst>
+    <dgm:linClrLst meth="repeat">
+      <a:schemeClr val="accent1">
+        <a:tint val="60000"/>
+      </a:schemeClr>
+    </dgm:linClrLst>
+    <dgm:effectClrLst/>
+    <dgm:txLinClrLst/>
+    <dgm:txFillClrLst meth="repeat">
+      <a:schemeClr val="lt1"/>
+    </dgm:txFillClrLst>
+    <dgm:txEffectClrLst/>
+  </dgm:styleLbl>
+  <dgm:styleLbl name="parChTrans2D2">
+    <dgm:fillClrLst meth="repeat">
+      <a:schemeClr val="accent1"/>
+    </dgm:fillClrLst>
+    <dgm:linClrLst meth="repeat">
+      <a:schemeClr val="accent1"/>
+    </dgm:linClrLst>
+    <dgm:effectClrLst/>
+    <dgm:txLinClrLst/>
+    <dgm:txFillClrLst meth="repeat">
+      <a:schemeClr val="lt1"/>
+    </dgm:txFillClrLst>
+    <dgm:txEffectClrLst/>
+  </dgm:styleLbl>
+  <dgm:styleLbl name="parChTrans2D3">
+    <dgm:fillClrLst meth="repeat">
+      <a:schemeClr val="accent1"/>
+    </dgm:fillClrLst>
+    <dgm:linClrLst meth="repeat">
+      <a:schemeClr val="accent1"/>
+    </dgm:linClrLst>
+    <dgm:effectClrLst/>
+    <dgm:txLinClrLst/>
+    <dgm:txFillClrLst meth="repeat">
+      <a:schemeClr val="lt1"/>
+    </dgm:txFillClrLst>
+    <dgm:txEffectClrLst/>
+  </dgm:styleLbl>
+  <dgm:styleLbl name="parChTrans2D4">
+    <dgm:fillClrLst meth="repeat">
+      <a:schemeClr val="accent1"/>
+    </dgm:fillClrLst>
+    <dgm:linClrLst meth="repeat">
+      <a:schemeClr val="accent1"/>
+    </dgm:linClrLst>
+    <dgm:effectClrLst/>
+    <dgm:txLinClrLst/>
+    <dgm:txFillClrLst meth="repeat">
+      <a:schemeClr val="lt1"/>
+    </dgm:txFillClrLst>
+    <dgm:txEffectClrLst/>
+  </dgm:styleLbl>
+  <dgm:styleLbl name="parChTrans1D1">
+    <dgm:fillClrLst meth="repeat">
+      <a:schemeClr val="accent1"/>
+    </dgm:fillClrLst>
+    <dgm:linClrLst meth="repeat">
+      <a:schemeClr val="accent1">
+        <a:shade val="60000"/>
+      </a:schemeClr>
+    </dgm:linClrLst>
+    <dgm:effectClrLst/>
+    <dgm:txLinClrLst/>
+    <dgm:txFillClrLst meth="repeat">
+      <a:schemeClr val="tx1"/>
+    </dgm:txFillClrLst>
+    <dgm:txEffectClrLst/>
+  </dgm:styleLbl>
+  <dgm:styleLbl name="parChTrans1D2">
+    <dgm:fillClrLst meth="repeat">
+      <a:schemeClr val="accent1"/>
+    </dgm:fillClrLst>
+    <dgm:linClrLst meth="repeat">
+      <a:schemeClr val="accent1">
+        <a:shade val="60000"/>
+      </a:schemeClr>
+    </dgm:linClrLst>
+    <dgm:effectClrLst/>
+    <dgm:txLinClrLst/>
+    <dgm:txFillClrLst meth="repeat">
+      <a:schemeClr val="tx1"/>
+    </dgm:txFillClrLst>
+    <dgm:txEffectClrLst/>
+  </dgm:styleLbl>
+  <dgm:styleLbl name="parChTrans1D3">
+    <dgm:fillClrLst meth="repeat">
+      <a:schemeClr val="accent1"/>
+    </dgm:fillClrLst>
+    <dgm:linClrLst meth="repeat">
+      <a:schemeClr val="accent1">
+        <a:shade val="80000"/>
+      </a:schemeClr>
+    </dgm:linClrLst>
+    <dgm:effectClrLst/>
+    <dgm:txLinClrLst/>
+    <dgm:txFillClrLst meth="repeat">
+      <a:schemeClr val="tx1"/>
+    </dgm:txFillClrLst>
+    <dgm:txEffectClrLst/>
+  </dgm:styleLbl>
+  <dgm:styleLbl name="parChTrans1D4">
+    <dgm:fillClrLst meth="repeat">
+      <a:schemeClr val="accent1"/>
+    </dgm:fillClrLst>
+    <dgm:linClrLst meth="repeat">
+      <a:schemeClr val="accent1">
+        <a:shade val="80000"/>
+      </a:schemeClr>
+    </dgm:linClrLst>
+    <dgm:effectClrLst/>
+    <dgm:txLinClrLst/>
+    <dgm:txFillClrLst meth="repeat">
+      <a:schemeClr val="tx1"/>
+    </dgm:txFillClrLst>
+    <dgm:txEffectClrLst/>
+  </dgm:styleLbl>
+  <dgm:styleLbl name="fgAcc1">
+    <dgm:fillClrLst meth="repeat">
+      <a:schemeClr val="lt1">
+        <a:alpha val="90000"/>
+      </a:schemeClr>
+    </dgm:fillClrLst>
+    <dgm:linClrLst meth="repeat">
+      <a:schemeClr val="accent1"/>
+    </dgm:linClrLst>
+    <dgm:effectClrLst/>
+    <dgm:txLinClrLst/>
+    <dgm:txFillClrLst meth="repeat">
+      <a:schemeClr val="dk1"/>
+    </dgm:txFillClrLst>
+    <dgm:txEffectClrLst/>
+  </dgm:styleLbl>
+  <dgm:styleLbl name="conFgAcc1">
+    <dgm:fillClrLst meth="repeat">
+      <a:schemeClr val="lt1">
+        <a:alpha val="90000"/>
+      </a:schemeClr>
+    </dgm:fillClrLst>
+    <dgm:linClrLst meth="repeat">
+      <a:schemeClr val="accent1"/>
+    </dgm:linClrLst>
+    <dgm:effectClrLst/>
+    <dgm:txLinClrLst/>
+    <dgm:txFillClrLst meth="repeat">
+      <a:schemeClr val="dk1"/>
+    </dgm:txFillClrLst>
+    <dgm:txEffectClrLst/>
+  </dgm:styleLbl>
+  <dgm:styleLbl name="alignAcc1">
+    <dgm:fillClrLst meth="repeat">
+      <a:schemeClr val="lt1">
+        <a:alpha val="90000"/>
+      </a:schemeClr>
+    </dgm:fillClrLst>
+    <dgm:linClrLst meth="repeat">
+      <a:schemeClr val="accent1"/>
+    </dgm:linClrLst>
+    <dgm:effectClrLst/>
+    <dgm:txLinClrLst/>
+    <dgm:txFillClrLst meth="repeat">
+      <a:schemeClr val="dk1"/>
+    </dgm:txFillClrLst>
+    <dgm:txEffectClrLst/>
+  </dgm:styleLbl>
+  <dgm:styleLbl name="trAlignAcc1">
+    <dgm:fillClrLst meth="repeat">
+      <a:schemeClr val="lt1">
+        <a:alpha val="40000"/>
+      </a:schemeClr>
+    </dgm:fillClrLst>
+    <dgm:linClrLst meth="repeat">
+      <a:schemeClr val="accent1"/>
+    </dgm:linClrLst>
+    <dgm:effectClrLst/>
+    <dgm:txLinClrLst/>
+    <dgm:txFillClrLst meth="repeat">
+      <a:schemeClr val="dk1"/>
+    </dgm:txFillClrLst>
+    <dgm:txEffectClrLst/>
+  </dgm:styleLbl>
+  <dgm:styleLbl name="bgAcc1">
+    <dgm:fillClrLst meth="repeat">
+      <a:schemeClr val="lt1">
+        <a:alpha val="90000"/>
+      </a:schemeClr>
+    </dgm:fillClrLst>
+    <dgm:linClrLst meth="repeat">
+      <a:schemeClr val="accent1"/>
+    </dgm:linClrLst>
+    <dgm:effectClrLst/>
+    <dgm:txLinClrLst/>
+    <dgm:txFillClrLst meth="repeat">
+      <a:schemeClr val="dk1"/>
+    </dgm:txFillClrLst>
+    <dgm:txEffectClrLst/>
+  </dgm:styleLbl>
+  <dgm:styleLbl name="solidFgAcc1">
+    <dgm:fillClrLst meth="repeat">
+      <a:schemeClr val="lt1"/>
+    </dgm:fillClrLst>
+    <dgm:linClrLst meth="repeat">
+      <a:schemeClr val="accent1"/>
+    </dgm:linClrLst>
+    <dgm:effectClrLst/>
+    <dgm:txLinClrLst/>
+    <dgm:txFillClrLst meth="repeat">
+      <a:schemeClr val="dk1"/>
+    </dgm:txFillClrLst>
+    <dgm:txEffectClrLst/>
+  </dgm:styleLbl>
+  <dgm:styleLbl name="solidAlignAcc1">
+    <dgm:fillClrLst meth="repeat">
+      <a:schemeClr val="lt1"/>
+    </dgm:fillClrLst>
+    <dgm:linClrLst meth="repeat">
+      <a:schemeClr val="accent1"/>
+    </dgm:linClrLst>
+    <dgm:effectClrLst/>
+    <dgm:txLinClrLst/>
+    <dgm:txFillClrLst meth="repeat">
+      <a:schemeClr val="dk1"/>
+    </dgm:txFillClrLst>
+    <dgm:txEffectClrLst/>
+  </dgm:styleLbl>
+  <dgm:styleLbl name="solidBgAcc1">
+    <dgm:fillClrLst meth="repeat">
+      <a:schemeClr val="lt1"/>
+    </dgm:fillClrLst>
+    <dgm:linClrLst meth="repeat">
+      <a:schemeClr val="accent1"/>
+    </dgm:linClrLst>
+    <dgm:effectClrLst/>
+    <dgm:txLinClrLst/>
+    <dgm:txFillClrLst meth="repeat">
+      <a:schemeClr val="dk1"/>
+    </dgm:txFillClrLst>
+    <dgm:txEffectClrLst/>
+  </dgm:styleLbl>
+  <dgm:styleLbl name="fgAccFollowNode1">
+    <dgm:fillClrLst meth="repeat">
+      <a:schemeClr val="accent1">
+        <a:alpha val="90000"/>
+        <a:tint val="40000"/>
+      </a:schemeClr>
+    </dgm:fillClrLst>
+    <dgm:linClrLst meth="repeat">
+      <a:schemeClr val="accent1">
+        <a:alpha val="90000"/>
+        <a:tint val="40000"/>
+      </a:schemeClr>
+    </dgm:linClrLst>
+    <dgm:effectClrLst/>
+    <dgm:txLinClrLst/>
+    <dgm:txFillClrLst meth="repeat">
+      <a:schemeClr val="dk1"/>
+    </dgm:txFillClrLst>
+    <dgm:txEffectClrLst/>
+  </dgm:styleLbl>
+  <dgm:styleLbl name="alignAccFollowNode1">
+    <dgm:fillClrLst meth="repeat">
+      <a:schemeClr val="accent1">
+        <a:alpha val="90000"/>
+        <a:tint val="40000"/>
+      </a:schemeClr>
+    </dgm:fillClrLst>
+    <dgm:linClrLst meth="repeat">
+      <a:schemeClr val="accent1">
+        <a:alpha val="90000"/>
+        <a:tint val="40000"/>
+      </a:schemeClr>
+    </dgm:linClrLst>
+    <dgm:effectClrLst/>
+    <dgm:txLinClrLst/>
+    <dgm:txFillClrLst meth="repeat">
+      <a:schemeClr val="dk1"/>
+    </dgm:txFillClrLst>
+    <dgm:txEffectClrLst/>
+  </dgm:styleLbl>
+  <dgm:styleLbl name="bgAccFollowNode1">
+    <dgm:fillClrLst meth="repeat">
+      <a:schemeClr val="accent1">
+        <a:alpha val="90000"/>
+        <a:tint val="40000"/>
+      </a:schemeClr>
+    </dgm:fillClrLst>
+    <dgm:linClrLst meth="repeat">
+      <a:schemeClr val="accent1">
+        <a:alpha val="90000"/>
+        <a:tint val="40000"/>
+      </a:schemeClr>
+    </dgm:linClrLst>
+    <dgm:effectClrLst/>
+    <dgm:txLinClrLst/>
+    <dgm:txFillClrLst meth="repeat">
+      <a:schemeClr val="dk1"/>
+    </dgm:txFillClrLst>
+    <dgm:txEffectClrLst/>
+  </dgm:styleLbl>
+  <dgm:styleLbl name="fgAcc0">
+    <dgm:fillClrLst meth="repeat">
+      <a:schemeClr val="lt1">
+        <a:alpha val="90000"/>
+      </a:schemeClr>
+    </dgm:fillClrLst>
+    <dgm:linClrLst meth="repeat">
+      <a:schemeClr val="accent1"/>
+    </dgm:linClrLst>
+    <dgm:effectClrLst/>
+    <dgm:txLinClrLst/>
+    <dgm:txFillClrLst meth="repeat">
+      <a:schemeClr val="dk1"/>
+    </dgm:txFillClrLst>
+    <dgm:txEffectClrLst/>
+  </dgm:styleLbl>
+  <dgm:styleLbl name="fgAcc2">
+    <dgm:fillClrLst meth="repeat">
+      <a:schemeClr val="lt1">
+        <a:alpha val="90000"/>
+      </a:schemeClr>
+    </dgm:fillClrLst>
+    <dgm:linClrLst meth="repeat">
+      <a:schemeClr val="accent1"/>
+    </dgm:linClrLst>
+    <dgm:effectClrLst/>
+    <dgm:txLinClrLst/>
+    <dgm:txFillClrLst meth="repeat">
+      <a:schemeClr val="dk1"/>
+    </dgm:txFillClrLst>
+    <dgm:txEffectClrLst/>
+  </dgm:styleLbl>
+  <dgm:styleLbl name="fgAcc3">
+    <dgm:fillClrLst meth="repeat">
+      <a:schemeClr val="lt1">
+        <a:alpha val="90000"/>
+      </a:schemeClr>
+    </dgm:fillClrLst>
+    <dgm:linClrLst meth="repeat">
+      <a:schemeClr val="accent1"/>
+    </dgm:linClrLst>
+    <dgm:effectClrLst/>
+    <dgm:txLinClrLst/>
+    <dgm:txFillClrLst meth="repeat">
+      <a:schemeClr val="dk1"/>
+    </dgm:txFillClrLst>
+    <dgm:txEffectClrLst/>
+  </dgm:styleLbl>
+  <dgm:styleLbl name="fgAcc4">
+    <dgm:fillClrLst meth="repeat">
+      <a:schemeClr val="lt1">
+        <a:alpha val="90000"/>
+      </a:schemeClr>
+    </dgm:fillClrLst>
+    <dgm:linClrLst meth="repeat">
+      <a:schemeClr val="accent1"/>
+    </dgm:linClrLst>
+    <dgm:effectClrLst/>
+    <dgm:txLinClrLst/>
+    <dgm:txFillClrLst meth="repeat">
+      <a:schemeClr val="dk1"/>
+    </dgm:txFillClrLst>
+    <dgm:txEffectClrLst/>
+  </dgm:styleLbl>
+  <dgm:styleLbl name="bgShp">
+    <dgm:fillClrLst meth="repeat">
+      <a:schemeClr val="accent1">
+        <a:tint val="40000"/>
+      </a:schemeClr>
+    </dgm:fillClrLst>
+    <dgm:linClrLst meth="repeat">
+      <a:schemeClr val="accent1"/>
+    </dgm:linClrLst>
+    <dgm:effectClrLst/>
+    <dgm:txLinClrLst/>
+    <dgm:txFillClrLst meth="repeat">
+      <a:schemeClr val="dk1"/>
+    </dgm:txFillClrLst>
+    <dgm:txEffectClrLst/>
+  </dgm:styleLbl>
+  <dgm:styleLbl name="dkBgShp">
+    <dgm:fillClrLst meth="repeat">
+      <a:schemeClr val="accent1">
+        <a:shade val="80000"/>
+      </a:schemeClr>
+    </dgm:fillClrLst>
+    <dgm:linClrLst meth="repeat">
+      <a:schemeClr val="accent1"/>
+    </dgm:linClrLst>
+    <dgm:effectClrLst/>
+    <dgm:txLinClrLst/>
+    <dgm:txFillClrLst meth="repeat">
+      <a:schemeClr val="lt1"/>
+    </dgm:txFillClrLst>
+    <dgm:txEffectClrLst/>
+  </dgm:styleLbl>
+  <dgm:styleLbl name="trBgShp">
+    <dgm:fillClrLst meth="repeat">
+      <a:schemeClr val="accent1">
+        <a:tint val="50000"/>
+        <a:alpha val="40000"/>
+      </a:schemeClr>
+    </dgm:fillClrLst>
+    <dgm:linClrLst meth="repeat">
+      <a:schemeClr val="accent1"/>
+    </dgm:linClrLst>
+    <dgm:effectClrLst/>
+    <dgm:txLinClrLst/>
+    <dgm:txFillClrLst meth="repeat">
+      <a:schemeClr val="lt1"/>
+    </dgm:txFillClrLst>
+    <dgm:txEffectClrLst/>
+  </dgm:styleLbl>
+  <dgm:styleLbl name="fgShp">
+    <dgm:fillClrLst meth="repeat">
+      <a:schemeClr val="accent1">
+        <a:tint val="60000"/>
+      </a:schemeClr>
+    </dgm:fillClrLst>
+    <dgm:linClrLst meth="repeat">
+      <a:schemeClr val="lt1"/>
+    </dgm:linClrLst>
+    <dgm:effectClrLst/>
+    <dgm:txLinClrLst/>
+    <dgm:txFillClrLst meth="repeat">
+      <a:schemeClr val="dk1"/>
+    </dgm:txFillClrLst>
+    <dgm:txEffectClrLst/>
+  </dgm:styleLbl>
+  <dgm:styleLbl name="revTx">
+    <dgm:fillClrLst meth="repeat">
+      <a:schemeClr val="lt1">
+        <a:alpha val="0"/>
+      </a:schemeClr>
+    </dgm:fillClrLst>
+    <dgm:linClrLst meth="repeat">
+      <a:schemeClr val="dk1">
+        <a:alpha val="0"/>
+      </a:schemeClr>
+    </dgm:linClrLst>
+    <dgm:effectClrLst/>
+    <dgm:txLinClrLst/>
+    <dgm:txFillClrLst meth="repeat">
+      <a:schemeClr val="tx1"/>
+    </dgm:txFillClrLst>
+    <dgm:txEffectClrLst/>
+  </dgm:styleLbl>
+</dgm:colorsDef>
+</file>
+
 <file path=ppt/diagrams/data1.xml><?xml version="1.0" encoding="utf-8"?>
 <dgm:dataModel xmlns:dgm="http://schemas.openxmlformats.org/drawingml/2006/diagram" xmlns:a="http://schemas.openxmlformats.org/drawingml/2006/main">
   <dgm:ptLst>
@@ -918,6 +1665,13 @@
         </dgm:presLayoutVars>
       </dgm:prSet>
       <dgm:spPr/>
+      <dgm:t>
+        <a:bodyPr/>
+        <a:lstStyle/>
+        <a:p>
+          <a:endParaRPr lang="en-US"/>
+        </a:p>
+      </dgm:t>
     </dgm:pt>
     <dgm:pt modelId="{845ADB6B-E6D7-C743-8057-328172716206}" type="pres">
       <dgm:prSet presAssocID="{E00070B6-92FC-3C43-861E-653C58F63B21}" presName="node" presStyleLbl="node1" presStyleIdx="0" presStyleCnt="1">
@@ -926,6 +1680,13 @@
         </dgm:presLayoutVars>
       </dgm:prSet>
       <dgm:spPr/>
+      <dgm:t>
+        <a:bodyPr/>
+        <a:lstStyle/>
+        <a:p>
+          <a:endParaRPr lang="en-US"/>
+        </a:p>
+      </dgm:t>
     </dgm:pt>
   </dgm:ptLst>
   <dgm:cxnLst>
@@ -933,6 +1694,92 @@
     <dgm:cxn modelId="{A6CD1ABF-680B-B743-B515-4D2ABCAD4256}" srcId="{766DD792-72D9-9F43-9963-5CE129E38E79}" destId="{E00070B6-92FC-3C43-861E-653C58F63B21}" srcOrd="0" destOrd="0" parTransId="{79192F38-FD68-BB4D-B976-971ED9CD4946}" sibTransId="{EA119ED2-A6CA-9D48-879E-8FDBF0978E11}"/>
     <dgm:cxn modelId="{08A620FB-430B-4E4A-85AC-387EDB847C0D}" type="presOf" srcId="{766DD792-72D9-9F43-9963-5CE129E38E79}" destId="{DF1AFFCD-8EE2-F04E-8B7D-1AC20617C2D4}" srcOrd="0" destOrd="0" presId="urn:microsoft.com/office/officeart/2005/8/layout/process1"/>
     <dgm:cxn modelId="{1EF96FDA-E19A-8743-8F0A-AE8C628F2449}" type="presParOf" srcId="{DF1AFFCD-8EE2-F04E-8B7D-1AC20617C2D4}" destId="{845ADB6B-E6D7-C743-8057-328172716206}" srcOrd="0" destOrd="0" presId="urn:microsoft.com/office/officeart/2005/8/layout/process1"/>
+  </dgm:cxnLst>
+  <dgm:bg/>
+  <dgm:whole/>
+  <dgm:extLst>
+    <a:ext uri="http://schemas.microsoft.com/office/drawing/2008/diagram">
+      <dsp:dataModelExt xmlns:dsp="http://schemas.microsoft.com/office/drawing/2008/diagram" relId="rId6" minVer="http://schemas.openxmlformats.org/drawingml/2006/diagram"/>
+    </a:ext>
+  </dgm:extLst>
+</dgm:dataModel>
+</file>
+
+<file path=ppt/diagrams/data2.xml><?xml version="1.0" encoding="utf-8"?>
+<dgm:dataModel xmlns:dgm="http://schemas.openxmlformats.org/drawingml/2006/diagram" xmlns:a="http://schemas.openxmlformats.org/drawingml/2006/main">
+  <dgm:ptLst>
+    <dgm:pt modelId="{B262B343-9F3B-9240-80A5-C2919E1BEC19}" type="doc">
+      <dgm:prSet loTypeId="urn:microsoft.com/office/officeart/2005/8/layout/process1" loCatId="" qsTypeId="urn:microsoft.com/office/officeart/2005/8/quickstyle/simple1" qsCatId="simple" csTypeId="urn:microsoft.com/office/officeart/2005/8/colors/accent1_2" csCatId="accent1"/>
+      <dgm:spPr/>
+      <dgm:t>
+        <a:bodyPr/>
+        <a:lstStyle/>
+        <a:p>
+          <a:endParaRPr lang="en-US"/>
+        </a:p>
+      </dgm:t>
+    </dgm:pt>
+    <dgm:pt modelId="{79B51750-367C-3946-8CB8-EB865B497147}">
+      <dgm:prSet/>
+      <dgm:spPr/>
+      <dgm:t>
+        <a:bodyPr/>
+        <a:lstStyle/>
+        <a:p>
+          <a:pPr rtl="0"/>
+          <a:r>
+            <a:rPr lang="en-US" baseline="30000" smtClean="0"/>
+            <a:t>All of the main topics addressed in the homework assignments were featured, and the addition of the player tied the Game AI theme of improving the player experience into the course.</a:t>
+          </a:r>
+          <a:endParaRPr lang="en-US"/>
+        </a:p>
+      </dgm:t>
+    </dgm:pt>
+    <dgm:pt modelId="{3DE2BFDA-1425-294B-A753-CB9AA9595D6E}" type="parTrans" cxnId="{8E268167-3A58-EA41-ABBF-066687636B2A}">
+      <dgm:prSet/>
+      <dgm:spPr/>
+      <dgm:t>
+        <a:bodyPr/>
+        <a:lstStyle/>
+        <a:p>
+          <a:endParaRPr lang="en-US"/>
+        </a:p>
+      </dgm:t>
+    </dgm:pt>
+    <dgm:pt modelId="{4D6091C2-20B1-E94A-B4A3-547C1747D954}" type="sibTrans" cxnId="{8E268167-3A58-EA41-ABBF-066687636B2A}">
+      <dgm:prSet/>
+      <dgm:spPr/>
+      <dgm:t>
+        <a:bodyPr/>
+        <a:lstStyle/>
+        <a:p>
+          <a:endParaRPr lang="en-US"/>
+        </a:p>
+      </dgm:t>
+    </dgm:pt>
+    <dgm:pt modelId="{DF494B24-D90E-1346-92FB-333DBD298A32}" type="pres">
+      <dgm:prSet presAssocID="{B262B343-9F3B-9240-80A5-C2919E1BEC19}" presName="Name0" presStyleCnt="0">
+        <dgm:presLayoutVars>
+          <dgm:dir/>
+          <dgm:resizeHandles val="exact"/>
+        </dgm:presLayoutVars>
+      </dgm:prSet>
+      <dgm:spPr/>
+    </dgm:pt>
+    <dgm:pt modelId="{07776952-9E47-DC46-9E47-349DCDA1EFD2}" type="pres">
+      <dgm:prSet presAssocID="{79B51750-367C-3946-8CB8-EB865B497147}" presName="node" presStyleLbl="node1" presStyleIdx="0" presStyleCnt="1" custLinFactY="43239" custLinFactNeighborX="-32080" custLinFactNeighborY="100000">
+        <dgm:presLayoutVars>
+          <dgm:bulletEnabled val="1"/>
+        </dgm:presLayoutVars>
+      </dgm:prSet>
+      <dgm:spPr/>
+    </dgm:pt>
+  </dgm:ptLst>
+  <dgm:cxnLst>
+    <dgm:cxn modelId="{3B6172E7-FB0B-744E-941D-2CC3B894B866}" type="presOf" srcId="{79B51750-367C-3946-8CB8-EB865B497147}" destId="{07776952-9E47-DC46-9E47-349DCDA1EFD2}" srcOrd="0" destOrd="0" presId="urn:microsoft.com/office/officeart/2005/8/layout/process1"/>
+    <dgm:cxn modelId="{47E32413-9603-A648-B644-CE86BCC9F8F8}" type="presOf" srcId="{B262B343-9F3B-9240-80A5-C2919E1BEC19}" destId="{DF494B24-D90E-1346-92FB-333DBD298A32}" srcOrd="0" destOrd="0" presId="urn:microsoft.com/office/officeart/2005/8/layout/process1"/>
+    <dgm:cxn modelId="{8E268167-3A58-EA41-ABBF-066687636B2A}" srcId="{B262B343-9F3B-9240-80A5-C2919E1BEC19}" destId="{79B51750-367C-3946-8CB8-EB865B497147}" srcOrd="0" destOrd="0" parTransId="{3DE2BFDA-1425-294B-A753-CB9AA9595D6E}" sibTransId="{4D6091C2-20B1-E94A-B4A3-547C1747D954}"/>
+    <dgm:cxn modelId="{7B496EA6-AF40-0A4A-BA05-E443C19DDBF7}" type="presParOf" srcId="{DF494B24-D90E-1346-92FB-333DBD298A32}" destId="{07776952-9E47-DC46-9E47-349DCDA1EFD2}" srcOrd="0" destOrd="0" presId="urn:microsoft.com/office/officeart/2005/8/layout/process1"/>
   </dgm:cxnLst>
   <dgm:bg/>
   <dgm:whole/>
@@ -1029,6 +1876,97 @@
       <dsp:txXfrm>
         <a:off x="35789" y="32030"/>
         <a:ext cx="7627051" cy="1029510"/>
+      </dsp:txXfrm>
+    </dsp:sp>
+  </dsp:spTree>
+</dsp:drawing>
+</file>
+
+<file path=ppt/diagrams/drawing2.xml><?xml version="1.0" encoding="utf-8"?>
+<dsp:drawing xmlns:dgm="http://schemas.openxmlformats.org/drawingml/2006/diagram" xmlns:dsp="http://schemas.microsoft.com/office/drawing/2008/diagram" xmlns:a="http://schemas.openxmlformats.org/drawingml/2006/main">
+  <dsp:spTree>
+    <dsp:nvGrpSpPr>
+      <dsp:cNvPr id="0" name=""/>
+      <dsp:cNvGrpSpPr/>
+    </dsp:nvGrpSpPr>
+    <dsp:grpSpPr/>
+    <dsp:sp modelId="{07776952-9E47-DC46-9E47-349DCDA1EFD2}">
+      <dsp:nvSpPr>
+        <dsp:cNvPr id="0" name=""/>
+        <dsp:cNvSpPr/>
+      </dsp:nvSpPr>
+      <dsp:spPr>
+        <a:xfrm>
+          <a:off x="0" y="0"/>
+          <a:ext cx="6479890" cy="1306013"/>
+        </a:xfrm>
+        <a:prstGeom prst="roundRect">
+          <a:avLst>
+            <a:gd name="adj" fmla="val 10000"/>
+          </a:avLst>
+        </a:prstGeom>
+        <a:solidFill>
+          <a:schemeClr val="accent1">
+            <a:hueOff val="0"/>
+            <a:satOff val="0"/>
+            <a:lumOff val="0"/>
+            <a:alphaOff val="0"/>
+          </a:schemeClr>
+        </a:solidFill>
+        <a:ln w="25400" cap="flat" cmpd="sng" algn="ctr">
+          <a:solidFill>
+            <a:schemeClr val="lt1">
+              <a:hueOff val="0"/>
+              <a:satOff val="0"/>
+              <a:lumOff val="0"/>
+              <a:alphaOff val="0"/>
+            </a:schemeClr>
+          </a:solidFill>
+          <a:prstDash val="solid"/>
+        </a:ln>
+        <a:effectLst/>
+      </dsp:spPr>
+      <dsp:style>
+        <a:lnRef idx="2">
+          <a:scrgbClr r="0" g="0" b="0"/>
+        </a:lnRef>
+        <a:fillRef idx="1">
+          <a:scrgbClr r="0" g="0" b="0"/>
+        </a:fillRef>
+        <a:effectRef idx="0">
+          <a:scrgbClr r="0" g="0" b="0"/>
+        </a:effectRef>
+        <a:fontRef idx="minor">
+          <a:schemeClr val="lt1"/>
+        </a:fontRef>
+      </dsp:style>
+      <dsp:txBody>
+        <a:bodyPr spcFirstLastPara="0" vert="horz" wrap="square" lIns="102870" tIns="102870" rIns="102870" bIns="102870" numCol="1" spcCol="1270" anchor="ctr" anchorCtr="0">
+          <a:noAutofit/>
+        </a:bodyPr>
+        <a:lstStyle/>
+        <a:p>
+          <a:pPr lvl="0" algn="ctr" defTabSz="1200150" rtl="0">
+            <a:lnSpc>
+              <a:spcPct val="90000"/>
+            </a:lnSpc>
+            <a:spcBef>
+              <a:spcPct val="0"/>
+            </a:spcBef>
+            <a:spcAft>
+              <a:spcPct val="35000"/>
+            </a:spcAft>
+          </a:pPr>
+          <a:r>
+            <a:rPr lang="en-US" sz="2700" kern="1200" baseline="30000" smtClean="0"/>
+            <a:t>All of the main topics addressed in the homework assignments were featured, and the addition of the player tied the Game AI theme of improving the player experience into the course.</a:t>
+          </a:r>
+          <a:endParaRPr lang="en-US" sz="2700" kern="1200"/>
+        </a:p>
+      </dsp:txBody>
+      <dsp:txXfrm>
+        <a:off x="38252" y="38252"/>
+        <a:ext cx="6403386" cy="1229509"/>
       </dsp:txXfrm>
     </dsp:sp>
   </dsp:spTree>
@@ -1181,7 +2119,1187 @@
 </dgm:layoutDef>
 </file>
 
+<file path=ppt/diagrams/layout2.xml><?xml version="1.0" encoding="utf-8"?>
+<dgm:layoutDef xmlns:dgm="http://schemas.openxmlformats.org/drawingml/2006/diagram" xmlns:a="http://schemas.openxmlformats.org/drawingml/2006/main" uniqueId="urn:microsoft.com/office/officeart/2005/8/layout/process1">
+  <dgm:title val=""/>
+  <dgm:desc val=""/>
+  <dgm:catLst>
+    <dgm:cat type="process" pri="1000"/>
+    <dgm:cat type="convert" pri="15000"/>
+  </dgm:catLst>
+  <dgm:sampData useDef="1">
+    <dgm:dataModel>
+      <dgm:ptLst/>
+      <dgm:bg/>
+      <dgm:whole/>
+    </dgm:dataModel>
+  </dgm:sampData>
+  <dgm:styleData>
+    <dgm:dataModel>
+      <dgm:ptLst>
+        <dgm:pt modelId="0" type="doc"/>
+        <dgm:pt modelId="1"/>
+        <dgm:pt modelId="2"/>
+      </dgm:ptLst>
+      <dgm:cxnLst>
+        <dgm:cxn modelId="3" srcId="0" destId="1" srcOrd="0" destOrd="0"/>
+        <dgm:cxn modelId="4" srcId="0" destId="2" srcOrd="1" destOrd="0"/>
+      </dgm:cxnLst>
+      <dgm:bg/>
+      <dgm:whole/>
+    </dgm:dataModel>
+  </dgm:styleData>
+  <dgm:clrData>
+    <dgm:dataModel>
+      <dgm:ptLst>
+        <dgm:pt modelId="0" type="doc"/>
+        <dgm:pt modelId="1"/>
+        <dgm:pt modelId="2"/>
+        <dgm:pt modelId="3"/>
+        <dgm:pt modelId="4"/>
+      </dgm:ptLst>
+      <dgm:cxnLst>
+        <dgm:cxn modelId="5" srcId="0" destId="1" srcOrd="0" destOrd="0"/>
+        <dgm:cxn modelId="6" srcId="0" destId="2" srcOrd="1" destOrd="0"/>
+        <dgm:cxn modelId="7" srcId="0" destId="3" srcOrd="2" destOrd="0"/>
+        <dgm:cxn modelId="8" srcId="0" destId="4" srcOrd="3" destOrd="0"/>
+      </dgm:cxnLst>
+      <dgm:bg/>
+      <dgm:whole/>
+    </dgm:dataModel>
+  </dgm:clrData>
+  <dgm:layoutNode name="Name0">
+    <dgm:varLst>
+      <dgm:dir/>
+      <dgm:resizeHandles val="exact"/>
+    </dgm:varLst>
+    <dgm:choose name="Name1">
+      <dgm:if name="Name2" func="var" arg="dir" op="equ" val="norm">
+        <dgm:alg type="lin"/>
+      </dgm:if>
+      <dgm:else name="Name3">
+        <dgm:alg type="lin">
+          <dgm:param type="linDir" val="fromR"/>
+        </dgm:alg>
+      </dgm:else>
+    </dgm:choose>
+    <dgm:shape xmlns:r="http://schemas.openxmlformats.org/officeDocument/2006/relationships" r:blip="">
+      <dgm:adjLst/>
+    </dgm:shape>
+    <dgm:presOf/>
+    <dgm:constrLst>
+      <dgm:constr type="w" for="ch" ptType="node" refType="w"/>
+      <dgm:constr type="h" for="ch" ptType="node" op="equ"/>
+      <dgm:constr type="primFontSz" for="ch" ptType="node" op="equ" val="65"/>
+      <dgm:constr type="w" for="ch" ptType="sibTrans" refType="w" refFor="ch" refPtType="node" op="equ" fact="0.4"/>
+      <dgm:constr type="h" for="ch" ptType="sibTrans" op="equ"/>
+      <dgm:constr type="primFontSz" for="des" forName="connectorText" op="equ" val="55"/>
+      <dgm:constr type="primFontSz" for="des" forName="connectorText" refType="primFontSz" refFor="ch" refPtType="node" op="lte" fact="0.8"/>
+    </dgm:constrLst>
+    <dgm:ruleLst/>
+    <dgm:forEach name="nodesForEach" axis="ch" ptType="node">
+      <dgm:layoutNode name="node">
+        <dgm:varLst>
+          <dgm:bulletEnabled val="1"/>
+        </dgm:varLst>
+        <dgm:alg type="tx"/>
+        <dgm:shape xmlns:r="http://schemas.openxmlformats.org/officeDocument/2006/relationships" type="roundRect" r:blip="">
+          <dgm:adjLst>
+            <dgm:adj idx="1" val="0.1"/>
+          </dgm:adjLst>
+        </dgm:shape>
+        <dgm:presOf axis="desOrSelf" ptType="node"/>
+        <dgm:constrLst>
+          <dgm:constr type="h" refType="w" fact="0.6"/>
+          <dgm:constr type="tMarg" refType="primFontSz" fact="0.3"/>
+          <dgm:constr type="bMarg" refType="primFontSz" fact="0.3"/>
+          <dgm:constr type="lMarg" refType="primFontSz" fact="0.3"/>
+          <dgm:constr type="rMarg" refType="primFontSz" fact="0.3"/>
+        </dgm:constrLst>
+        <dgm:ruleLst>
+          <dgm:rule type="primFontSz" val="18" fact="NaN" max="NaN"/>
+          <dgm:rule type="h" val="NaN" fact="1.5" max="NaN"/>
+          <dgm:rule type="primFontSz" val="5" fact="NaN" max="NaN"/>
+          <dgm:rule type="h" val="INF" fact="NaN" max="NaN"/>
+        </dgm:ruleLst>
+      </dgm:layoutNode>
+      <dgm:forEach name="sibTransForEach" axis="followSib" ptType="sibTrans" cnt="1">
+        <dgm:layoutNode name="sibTrans">
+          <dgm:alg type="conn">
+            <dgm:param type="begPts" val="auto"/>
+            <dgm:param type="endPts" val="auto"/>
+          </dgm:alg>
+          <dgm:shape xmlns:r="http://schemas.openxmlformats.org/officeDocument/2006/relationships" type="conn" r:blip="">
+            <dgm:adjLst/>
+          </dgm:shape>
+          <dgm:presOf axis="self"/>
+          <dgm:constrLst>
+            <dgm:constr type="h" refType="w" fact="0.62"/>
+            <dgm:constr type="connDist"/>
+            <dgm:constr type="begPad" refType="connDist" fact="0.25"/>
+            <dgm:constr type="endPad" refType="connDist" fact="0.22"/>
+          </dgm:constrLst>
+          <dgm:ruleLst/>
+          <dgm:layoutNode name="connectorText">
+            <dgm:alg type="tx">
+              <dgm:param type="autoTxRot" val="grav"/>
+            </dgm:alg>
+            <dgm:shape xmlns:r="http://schemas.openxmlformats.org/officeDocument/2006/relationships" type="conn" r:blip="" hideGeom="1">
+              <dgm:adjLst/>
+            </dgm:shape>
+            <dgm:presOf axis="self"/>
+            <dgm:constrLst>
+              <dgm:constr type="lMarg"/>
+              <dgm:constr type="rMarg"/>
+              <dgm:constr type="tMarg"/>
+              <dgm:constr type="bMarg"/>
+            </dgm:constrLst>
+            <dgm:ruleLst>
+              <dgm:rule type="primFontSz" val="5" fact="NaN" max="NaN"/>
+            </dgm:ruleLst>
+          </dgm:layoutNode>
+        </dgm:layoutNode>
+      </dgm:forEach>
+    </dgm:forEach>
+  </dgm:layoutNode>
+</dgm:layoutDef>
+</file>
+
 <file path=ppt/diagrams/quickStyle1.xml><?xml version="1.0" encoding="utf-8"?>
+<dgm:styleDef xmlns:dgm="http://schemas.openxmlformats.org/drawingml/2006/diagram" xmlns:a="http://schemas.openxmlformats.org/drawingml/2006/main" uniqueId="urn:microsoft.com/office/officeart/2005/8/quickstyle/simple1">
+  <dgm:title val=""/>
+  <dgm:desc val=""/>
+  <dgm:catLst>
+    <dgm:cat type="simple" pri="10100"/>
+  </dgm:catLst>
+  <dgm:scene3d>
+    <a:camera prst="orthographicFront"/>
+    <a:lightRig rig="threePt" dir="t"/>
+  </dgm:scene3d>
+  <dgm:styleLbl name="node0">
+    <dgm:scene3d>
+      <a:camera prst="orthographicFront"/>
+      <a:lightRig rig="threePt" dir="t"/>
+    </dgm:scene3d>
+    <dgm:sp3d/>
+    <dgm:txPr/>
+    <dgm:style>
+      <a:lnRef idx="2">
+        <a:scrgbClr r="0" g="0" b="0"/>
+      </a:lnRef>
+      <a:fillRef idx="1">
+        <a:scrgbClr r="0" g="0" b="0"/>
+      </a:fillRef>
+      <a:effectRef idx="0">
+        <a:scrgbClr r="0" g="0" b="0"/>
+      </a:effectRef>
+      <a:fontRef idx="minor">
+        <a:schemeClr val="lt1"/>
+      </a:fontRef>
+    </dgm:style>
+  </dgm:styleLbl>
+  <dgm:styleLbl name="lnNode1">
+    <dgm:scene3d>
+      <a:camera prst="orthographicFront"/>
+      <a:lightRig rig="threePt" dir="t"/>
+    </dgm:scene3d>
+    <dgm:sp3d/>
+    <dgm:txPr/>
+    <dgm:style>
+      <a:lnRef idx="2">
+        <a:scrgbClr r="0" g="0" b="0"/>
+      </a:lnRef>
+      <a:fillRef idx="1">
+        <a:scrgbClr r="0" g="0" b="0"/>
+      </a:fillRef>
+      <a:effectRef idx="0">
+        <a:scrgbClr r="0" g="0" b="0"/>
+      </a:effectRef>
+      <a:fontRef idx="minor">
+        <a:schemeClr val="lt1"/>
+      </a:fontRef>
+    </dgm:style>
+  </dgm:styleLbl>
+  <dgm:styleLbl name="vennNode1">
+    <dgm:scene3d>
+      <a:camera prst="orthographicFront"/>
+      <a:lightRig rig="threePt" dir="t"/>
+    </dgm:scene3d>
+    <dgm:sp3d/>
+    <dgm:txPr/>
+    <dgm:style>
+      <a:lnRef idx="2">
+        <a:scrgbClr r="0" g="0" b="0"/>
+      </a:lnRef>
+      <a:fillRef idx="1">
+        <a:scrgbClr r="0" g="0" b="0"/>
+      </a:fillRef>
+      <a:effectRef idx="0">
+        <a:scrgbClr r="0" g="0" b="0"/>
+      </a:effectRef>
+      <a:fontRef idx="minor">
+        <a:schemeClr val="tx1"/>
+      </a:fontRef>
+    </dgm:style>
+  </dgm:styleLbl>
+  <dgm:styleLbl name="alignNode1">
+    <dgm:scene3d>
+      <a:camera prst="orthographicFront"/>
+      <a:lightRig rig="threePt" dir="t"/>
+    </dgm:scene3d>
+    <dgm:sp3d/>
+    <dgm:txPr/>
+    <dgm:style>
+      <a:lnRef idx="2">
+        <a:scrgbClr r="0" g="0" b="0"/>
+      </a:lnRef>
+      <a:fillRef idx="1">
+        <a:scrgbClr r="0" g="0" b="0"/>
+      </a:fillRef>
+      <a:effectRef idx="0">
+        <a:scrgbClr r="0" g="0" b="0"/>
+      </a:effectRef>
+      <a:fontRef idx="minor">
+        <a:schemeClr val="lt1"/>
+      </a:fontRef>
+    </dgm:style>
+  </dgm:styleLbl>
+  <dgm:styleLbl name="node1">
+    <dgm:scene3d>
+      <a:camera prst="orthographicFront"/>
+      <a:lightRig rig="threePt" dir="t"/>
+    </dgm:scene3d>
+    <dgm:sp3d/>
+    <dgm:txPr/>
+    <dgm:style>
+      <a:lnRef idx="2">
+        <a:scrgbClr r="0" g="0" b="0"/>
+      </a:lnRef>
+      <a:fillRef idx="1">
+        <a:scrgbClr r="0" g="0" b="0"/>
+      </a:fillRef>
+      <a:effectRef idx="0">
+        <a:scrgbClr r="0" g="0" b="0"/>
+      </a:effectRef>
+      <a:fontRef idx="minor">
+        <a:schemeClr val="lt1"/>
+      </a:fontRef>
+    </dgm:style>
+  </dgm:styleLbl>
+  <dgm:styleLbl name="node2">
+    <dgm:scene3d>
+      <a:camera prst="orthographicFront"/>
+      <a:lightRig rig="threePt" dir="t"/>
+    </dgm:scene3d>
+    <dgm:sp3d/>
+    <dgm:txPr/>
+    <dgm:style>
+      <a:lnRef idx="2">
+        <a:scrgbClr r="0" g="0" b="0"/>
+      </a:lnRef>
+      <a:fillRef idx="1">
+        <a:scrgbClr r="0" g="0" b="0"/>
+      </a:fillRef>
+      <a:effectRef idx="0">
+        <a:scrgbClr r="0" g="0" b="0"/>
+      </a:effectRef>
+      <a:fontRef idx="minor">
+        <a:schemeClr val="lt1"/>
+      </a:fontRef>
+    </dgm:style>
+  </dgm:styleLbl>
+  <dgm:styleLbl name="node3">
+    <dgm:scene3d>
+      <a:camera prst="orthographicFront"/>
+      <a:lightRig rig="threePt" dir="t"/>
+    </dgm:scene3d>
+    <dgm:sp3d/>
+    <dgm:txPr/>
+    <dgm:style>
+      <a:lnRef idx="2">
+        <a:scrgbClr r="0" g="0" b="0"/>
+      </a:lnRef>
+      <a:fillRef idx="1">
+        <a:scrgbClr r="0" g="0" b="0"/>
+      </a:fillRef>
+      <a:effectRef idx="0">
+        <a:scrgbClr r="0" g="0" b="0"/>
+      </a:effectRef>
+      <a:fontRef idx="minor">
+        <a:schemeClr val="lt1"/>
+      </a:fontRef>
+    </dgm:style>
+  </dgm:styleLbl>
+  <dgm:styleLbl name="node4">
+    <dgm:scene3d>
+      <a:camera prst="orthographicFront"/>
+      <a:lightRig rig="threePt" dir="t"/>
+    </dgm:scene3d>
+    <dgm:sp3d/>
+    <dgm:txPr/>
+    <dgm:style>
+      <a:lnRef idx="2">
+        <a:scrgbClr r="0" g="0" b="0"/>
+      </a:lnRef>
+      <a:fillRef idx="1">
+        <a:scrgbClr r="0" g="0" b="0"/>
+      </a:fillRef>
+      <a:effectRef idx="0">
+        <a:scrgbClr r="0" g="0" b="0"/>
+      </a:effectRef>
+      <a:fontRef idx="minor">
+        <a:schemeClr val="lt1"/>
+      </a:fontRef>
+    </dgm:style>
+  </dgm:styleLbl>
+  <dgm:styleLbl name="fgImgPlace1">
+    <dgm:scene3d>
+      <a:camera prst="orthographicFront"/>
+      <a:lightRig rig="threePt" dir="t"/>
+    </dgm:scene3d>
+    <dgm:sp3d/>
+    <dgm:txPr/>
+    <dgm:style>
+      <a:lnRef idx="2">
+        <a:scrgbClr r="0" g="0" b="0"/>
+      </a:lnRef>
+      <a:fillRef idx="1">
+        <a:scrgbClr r="0" g="0" b="0"/>
+      </a:fillRef>
+      <a:effectRef idx="0">
+        <a:scrgbClr r="0" g="0" b="0"/>
+      </a:effectRef>
+      <a:fontRef idx="minor"/>
+    </dgm:style>
+  </dgm:styleLbl>
+  <dgm:styleLbl name="alignImgPlace1">
+    <dgm:scene3d>
+      <a:camera prst="orthographicFront"/>
+      <a:lightRig rig="threePt" dir="t"/>
+    </dgm:scene3d>
+    <dgm:sp3d/>
+    <dgm:txPr/>
+    <dgm:style>
+      <a:lnRef idx="2">
+        <a:scrgbClr r="0" g="0" b="0"/>
+      </a:lnRef>
+      <a:fillRef idx="1">
+        <a:scrgbClr r="0" g="0" b="0"/>
+      </a:fillRef>
+      <a:effectRef idx="0">
+        <a:scrgbClr r="0" g="0" b="0"/>
+      </a:effectRef>
+      <a:fontRef idx="minor"/>
+    </dgm:style>
+  </dgm:styleLbl>
+  <dgm:styleLbl name="bgImgPlace1">
+    <dgm:scene3d>
+      <a:camera prst="orthographicFront"/>
+      <a:lightRig rig="threePt" dir="t"/>
+    </dgm:scene3d>
+    <dgm:sp3d/>
+    <dgm:txPr/>
+    <dgm:style>
+      <a:lnRef idx="2">
+        <a:scrgbClr r="0" g="0" b="0"/>
+      </a:lnRef>
+      <a:fillRef idx="1">
+        <a:scrgbClr r="0" g="0" b="0"/>
+      </a:fillRef>
+      <a:effectRef idx="0">
+        <a:scrgbClr r="0" g="0" b="0"/>
+      </a:effectRef>
+      <a:fontRef idx="minor"/>
+    </dgm:style>
+  </dgm:styleLbl>
+  <dgm:styleLbl name="sibTrans2D1">
+    <dgm:scene3d>
+      <a:camera prst="orthographicFront"/>
+      <a:lightRig rig="threePt" dir="t"/>
+    </dgm:scene3d>
+    <dgm:sp3d/>
+    <dgm:txPr/>
+    <dgm:style>
+      <a:lnRef idx="0">
+        <a:scrgbClr r="0" g="0" b="0"/>
+      </a:lnRef>
+      <a:fillRef idx="1">
+        <a:scrgbClr r="0" g="0" b="0"/>
+      </a:fillRef>
+      <a:effectRef idx="0">
+        <a:scrgbClr r="0" g="0" b="0"/>
+      </a:effectRef>
+      <a:fontRef idx="minor">
+        <a:schemeClr val="lt1"/>
+      </a:fontRef>
+    </dgm:style>
+  </dgm:styleLbl>
+  <dgm:styleLbl name="fgSibTrans2D1">
+    <dgm:scene3d>
+      <a:camera prst="orthographicFront"/>
+      <a:lightRig rig="threePt" dir="t"/>
+    </dgm:scene3d>
+    <dgm:sp3d/>
+    <dgm:txPr/>
+    <dgm:style>
+      <a:lnRef idx="0">
+        <a:scrgbClr r="0" g="0" b="0"/>
+      </a:lnRef>
+      <a:fillRef idx="1">
+        <a:scrgbClr r="0" g="0" b="0"/>
+      </a:fillRef>
+      <a:effectRef idx="0">
+        <a:scrgbClr r="0" g="0" b="0"/>
+      </a:effectRef>
+      <a:fontRef idx="minor">
+        <a:schemeClr val="lt1"/>
+      </a:fontRef>
+    </dgm:style>
+  </dgm:styleLbl>
+  <dgm:styleLbl name="bgSibTrans2D1">
+    <dgm:scene3d>
+      <a:camera prst="orthographicFront"/>
+      <a:lightRig rig="threePt" dir="t"/>
+    </dgm:scene3d>
+    <dgm:sp3d/>
+    <dgm:txPr/>
+    <dgm:style>
+      <a:lnRef idx="0">
+        <a:scrgbClr r="0" g="0" b="0"/>
+      </a:lnRef>
+      <a:fillRef idx="1">
+        <a:scrgbClr r="0" g="0" b="0"/>
+      </a:fillRef>
+      <a:effectRef idx="0">
+        <a:scrgbClr r="0" g="0" b="0"/>
+      </a:effectRef>
+      <a:fontRef idx="minor">
+        <a:schemeClr val="lt1"/>
+      </a:fontRef>
+    </dgm:style>
+  </dgm:styleLbl>
+  <dgm:styleLbl name="sibTrans1D1">
+    <dgm:scene3d>
+      <a:camera prst="orthographicFront"/>
+      <a:lightRig rig="threePt" dir="t"/>
+    </dgm:scene3d>
+    <dgm:sp3d/>
+    <dgm:txPr/>
+    <dgm:style>
+      <a:lnRef idx="1">
+        <a:scrgbClr r="0" g="0" b="0"/>
+      </a:lnRef>
+      <a:fillRef idx="0">
+        <a:scrgbClr r="0" g="0" b="0"/>
+      </a:fillRef>
+      <a:effectRef idx="0">
+        <a:scrgbClr r="0" g="0" b="0"/>
+      </a:effectRef>
+      <a:fontRef idx="minor"/>
+    </dgm:style>
+  </dgm:styleLbl>
+  <dgm:styleLbl name="callout">
+    <dgm:scene3d>
+      <a:camera prst="orthographicFront"/>
+      <a:lightRig rig="threePt" dir="t"/>
+    </dgm:scene3d>
+    <dgm:sp3d/>
+    <dgm:txPr/>
+    <dgm:style>
+      <a:lnRef idx="2">
+        <a:scrgbClr r="0" g="0" b="0"/>
+      </a:lnRef>
+      <a:fillRef idx="1">
+        <a:scrgbClr r="0" g="0" b="0"/>
+      </a:fillRef>
+      <a:effectRef idx="0">
+        <a:scrgbClr r="0" g="0" b="0"/>
+      </a:effectRef>
+      <a:fontRef idx="minor"/>
+    </dgm:style>
+  </dgm:styleLbl>
+  <dgm:styleLbl name="asst0">
+    <dgm:scene3d>
+      <a:camera prst="orthographicFront"/>
+      <a:lightRig rig="threePt" dir="t"/>
+    </dgm:scene3d>
+    <dgm:sp3d/>
+    <dgm:txPr/>
+    <dgm:style>
+      <a:lnRef idx="2">
+        <a:scrgbClr r="0" g="0" b="0"/>
+      </a:lnRef>
+      <a:fillRef idx="1">
+        <a:scrgbClr r="0" g="0" b="0"/>
+      </a:fillRef>
+      <a:effectRef idx="0">
+        <a:scrgbClr r="0" g="0" b="0"/>
+      </a:effectRef>
+      <a:fontRef idx="minor">
+        <a:schemeClr val="lt1"/>
+      </a:fontRef>
+    </dgm:style>
+  </dgm:styleLbl>
+  <dgm:styleLbl name="asst1">
+    <dgm:scene3d>
+      <a:camera prst="orthographicFront"/>
+      <a:lightRig rig="threePt" dir="t"/>
+    </dgm:scene3d>
+    <dgm:sp3d/>
+    <dgm:txPr/>
+    <dgm:style>
+      <a:lnRef idx="2">
+        <a:scrgbClr r="0" g="0" b="0"/>
+      </a:lnRef>
+      <a:fillRef idx="1">
+        <a:scrgbClr r="0" g="0" b="0"/>
+      </a:fillRef>
+      <a:effectRef idx="0">
+        <a:scrgbClr r="0" g="0" b="0"/>
+      </a:effectRef>
+      <a:fontRef idx="minor">
+        <a:schemeClr val="lt1"/>
+      </a:fontRef>
+    </dgm:style>
+  </dgm:styleLbl>
+  <dgm:styleLbl name="asst2">
+    <dgm:scene3d>
+      <a:camera prst="orthographicFront"/>
+      <a:lightRig rig="threePt" dir="t"/>
+    </dgm:scene3d>
+    <dgm:sp3d/>
+    <dgm:txPr/>
+    <dgm:style>
+      <a:lnRef idx="2">
+        <a:scrgbClr r="0" g="0" b="0"/>
+      </a:lnRef>
+      <a:fillRef idx="1">
+        <a:scrgbClr r="0" g="0" b="0"/>
+      </a:fillRef>
+      <a:effectRef idx="0">
+        <a:scrgbClr r="0" g="0" b="0"/>
+      </a:effectRef>
+      <a:fontRef idx="minor">
+        <a:schemeClr val="lt1"/>
+      </a:fontRef>
+    </dgm:style>
+  </dgm:styleLbl>
+  <dgm:styleLbl name="asst3">
+    <dgm:scene3d>
+      <a:camera prst="orthographicFront"/>
+      <a:lightRig rig="threePt" dir="t"/>
+    </dgm:scene3d>
+    <dgm:sp3d/>
+    <dgm:txPr/>
+    <dgm:style>
+      <a:lnRef idx="2">
+        <a:scrgbClr r="0" g="0" b="0"/>
+      </a:lnRef>
+      <a:fillRef idx="1">
+        <a:scrgbClr r="0" g="0" b="0"/>
+      </a:fillRef>
+      <a:effectRef idx="0">
+        <a:scrgbClr r="0" g="0" b="0"/>
+      </a:effectRef>
+      <a:fontRef idx="minor">
+        <a:schemeClr val="lt1"/>
+      </a:fontRef>
+    </dgm:style>
+  </dgm:styleLbl>
+  <dgm:styleLbl name="asst4">
+    <dgm:scene3d>
+      <a:camera prst="orthographicFront"/>
+      <a:lightRig rig="threePt" dir="t"/>
+    </dgm:scene3d>
+    <dgm:sp3d/>
+    <dgm:txPr/>
+    <dgm:style>
+      <a:lnRef idx="2">
+        <a:scrgbClr r="0" g="0" b="0"/>
+      </a:lnRef>
+      <a:fillRef idx="1">
+        <a:scrgbClr r="0" g="0" b="0"/>
+      </a:fillRef>
+      <a:effectRef idx="0">
+        <a:scrgbClr r="0" g="0" b="0"/>
+      </a:effectRef>
+      <a:fontRef idx="minor">
+        <a:schemeClr val="lt1"/>
+      </a:fontRef>
+    </dgm:style>
+  </dgm:styleLbl>
+  <dgm:styleLbl name="parChTrans2D1">
+    <dgm:scene3d>
+      <a:camera prst="orthographicFront"/>
+      <a:lightRig rig="threePt" dir="t"/>
+    </dgm:scene3d>
+    <dgm:sp3d/>
+    <dgm:txPr/>
+    <dgm:style>
+      <a:lnRef idx="2">
+        <a:scrgbClr r="0" g="0" b="0"/>
+      </a:lnRef>
+      <a:fillRef idx="1">
+        <a:scrgbClr r="0" g="0" b="0"/>
+      </a:fillRef>
+      <a:effectRef idx="0">
+        <a:scrgbClr r="0" g="0" b="0"/>
+      </a:effectRef>
+      <a:fontRef idx="minor">
+        <a:schemeClr val="lt1"/>
+      </a:fontRef>
+    </dgm:style>
+  </dgm:styleLbl>
+  <dgm:styleLbl name="parChTrans2D2">
+    <dgm:scene3d>
+      <a:camera prst="orthographicFront"/>
+      <a:lightRig rig="threePt" dir="t"/>
+    </dgm:scene3d>
+    <dgm:sp3d/>
+    <dgm:txPr/>
+    <dgm:style>
+      <a:lnRef idx="2">
+        <a:scrgbClr r="0" g="0" b="0"/>
+      </a:lnRef>
+      <a:fillRef idx="1">
+        <a:scrgbClr r="0" g="0" b="0"/>
+      </a:fillRef>
+      <a:effectRef idx="0">
+        <a:scrgbClr r="0" g="0" b="0"/>
+      </a:effectRef>
+      <a:fontRef idx="minor">
+        <a:schemeClr val="lt1"/>
+      </a:fontRef>
+    </dgm:style>
+  </dgm:styleLbl>
+  <dgm:styleLbl name="parChTrans2D3">
+    <dgm:scene3d>
+      <a:camera prst="orthographicFront"/>
+      <a:lightRig rig="threePt" dir="t"/>
+    </dgm:scene3d>
+    <dgm:sp3d/>
+    <dgm:txPr/>
+    <dgm:style>
+      <a:lnRef idx="2">
+        <a:scrgbClr r="0" g="0" b="0"/>
+      </a:lnRef>
+      <a:fillRef idx="1">
+        <a:scrgbClr r="0" g="0" b="0"/>
+      </a:fillRef>
+      <a:effectRef idx="0">
+        <a:scrgbClr r="0" g="0" b="0"/>
+      </a:effectRef>
+      <a:fontRef idx="minor">
+        <a:schemeClr val="lt1"/>
+      </a:fontRef>
+    </dgm:style>
+  </dgm:styleLbl>
+  <dgm:styleLbl name="parChTrans2D4">
+    <dgm:scene3d>
+      <a:camera prst="orthographicFront"/>
+      <a:lightRig rig="threePt" dir="t"/>
+    </dgm:scene3d>
+    <dgm:sp3d/>
+    <dgm:txPr/>
+    <dgm:style>
+      <a:lnRef idx="2">
+        <a:scrgbClr r="0" g="0" b="0"/>
+      </a:lnRef>
+      <a:fillRef idx="1">
+        <a:scrgbClr r="0" g="0" b="0"/>
+      </a:fillRef>
+      <a:effectRef idx="0">
+        <a:scrgbClr r="0" g="0" b="0"/>
+      </a:effectRef>
+      <a:fontRef idx="minor">
+        <a:schemeClr val="lt1"/>
+      </a:fontRef>
+    </dgm:style>
+  </dgm:styleLbl>
+  <dgm:styleLbl name="parChTrans1D1">
+    <dgm:scene3d>
+      <a:camera prst="orthographicFront"/>
+      <a:lightRig rig="threePt" dir="t"/>
+    </dgm:scene3d>
+    <dgm:sp3d/>
+    <dgm:txPr/>
+    <dgm:style>
+      <a:lnRef idx="2">
+        <a:scrgbClr r="0" g="0" b="0"/>
+      </a:lnRef>
+      <a:fillRef idx="0">
+        <a:scrgbClr r="0" g="0" b="0"/>
+      </a:fillRef>
+      <a:effectRef idx="0">
+        <a:scrgbClr r="0" g="0" b="0"/>
+      </a:effectRef>
+      <a:fontRef idx="minor"/>
+    </dgm:style>
+  </dgm:styleLbl>
+  <dgm:styleLbl name="parChTrans1D2">
+    <dgm:scene3d>
+      <a:camera prst="orthographicFront"/>
+      <a:lightRig rig="threePt" dir="t"/>
+    </dgm:scene3d>
+    <dgm:sp3d/>
+    <dgm:txPr/>
+    <dgm:style>
+      <a:lnRef idx="2">
+        <a:scrgbClr r="0" g="0" b="0"/>
+      </a:lnRef>
+      <a:fillRef idx="0">
+        <a:scrgbClr r="0" g="0" b="0"/>
+      </a:fillRef>
+      <a:effectRef idx="0">
+        <a:scrgbClr r="0" g="0" b="0"/>
+      </a:effectRef>
+      <a:fontRef idx="minor"/>
+    </dgm:style>
+  </dgm:styleLbl>
+  <dgm:styleLbl name="parChTrans1D3">
+    <dgm:scene3d>
+      <a:camera prst="orthographicFront"/>
+      <a:lightRig rig="threePt" dir="t"/>
+    </dgm:scene3d>
+    <dgm:sp3d/>
+    <dgm:txPr/>
+    <dgm:style>
+      <a:lnRef idx="2">
+        <a:scrgbClr r="0" g="0" b="0"/>
+      </a:lnRef>
+      <a:fillRef idx="0">
+        <a:scrgbClr r="0" g="0" b="0"/>
+      </a:fillRef>
+      <a:effectRef idx="0">
+        <a:scrgbClr r="0" g="0" b="0"/>
+      </a:effectRef>
+      <a:fontRef idx="minor"/>
+    </dgm:style>
+  </dgm:styleLbl>
+  <dgm:styleLbl name="parChTrans1D4">
+    <dgm:scene3d>
+      <a:camera prst="orthographicFront"/>
+      <a:lightRig rig="threePt" dir="t"/>
+    </dgm:scene3d>
+    <dgm:sp3d/>
+    <dgm:txPr/>
+    <dgm:style>
+      <a:lnRef idx="2">
+        <a:scrgbClr r="0" g="0" b="0"/>
+      </a:lnRef>
+      <a:fillRef idx="0">
+        <a:scrgbClr r="0" g="0" b="0"/>
+      </a:fillRef>
+      <a:effectRef idx="0">
+        <a:scrgbClr r="0" g="0" b="0"/>
+      </a:effectRef>
+      <a:fontRef idx="minor"/>
+    </dgm:style>
+  </dgm:styleLbl>
+  <dgm:styleLbl name="fgAcc1">
+    <dgm:scene3d>
+      <a:camera prst="orthographicFront"/>
+      <a:lightRig rig="threePt" dir="t"/>
+    </dgm:scene3d>
+    <dgm:sp3d/>
+    <dgm:txPr/>
+    <dgm:style>
+      <a:lnRef idx="2">
+        <a:scrgbClr r="0" g="0" b="0"/>
+      </a:lnRef>
+      <a:fillRef idx="1">
+        <a:scrgbClr r="0" g="0" b="0"/>
+      </a:fillRef>
+      <a:effectRef idx="0">
+        <a:scrgbClr r="0" g="0" b="0"/>
+      </a:effectRef>
+      <a:fontRef idx="minor"/>
+    </dgm:style>
+  </dgm:styleLbl>
+  <dgm:styleLbl name="conFgAcc1">
+    <dgm:scene3d>
+      <a:camera prst="orthographicFront"/>
+      <a:lightRig rig="threePt" dir="t"/>
+    </dgm:scene3d>
+    <dgm:sp3d/>
+    <dgm:txPr/>
+    <dgm:style>
+      <a:lnRef idx="2">
+        <a:scrgbClr r="0" g="0" b="0"/>
+      </a:lnRef>
+      <a:fillRef idx="1">
+        <a:scrgbClr r="0" g="0" b="0"/>
+      </a:fillRef>
+      <a:effectRef idx="0">
+        <a:scrgbClr r="0" g="0" b="0"/>
+      </a:effectRef>
+      <a:fontRef idx="minor"/>
+    </dgm:style>
+  </dgm:styleLbl>
+  <dgm:styleLbl name="alignAcc1">
+    <dgm:scene3d>
+      <a:camera prst="orthographicFront"/>
+      <a:lightRig rig="threePt" dir="t"/>
+    </dgm:scene3d>
+    <dgm:sp3d/>
+    <dgm:txPr/>
+    <dgm:style>
+      <a:lnRef idx="2">
+        <a:scrgbClr r="0" g="0" b="0"/>
+      </a:lnRef>
+      <a:fillRef idx="1">
+        <a:scrgbClr r="0" g="0" b="0"/>
+      </a:fillRef>
+      <a:effectRef idx="0">
+        <a:scrgbClr r="0" g="0" b="0"/>
+      </a:effectRef>
+      <a:fontRef idx="minor"/>
+    </dgm:style>
+  </dgm:styleLbl>
+  <dgm:styleLbl name="trAlignAcc1">
+    <dgm:scene3d>
+      <a:camera prst="orthographicFront"/>
+      <a:lightRig rig="threePt" dir="t"/>
+    </dgm:scene3d>
+    <dgm:sp3d/>
+    <dgm:txPr/>
+    <dgm:style>
+      <a:lnRef idx="1">
+        <a:scrgbClr r="0" g="0" b="0"/>
+      </a:lnRef>
+      <a:fillRef idx="1">
+        <a:scrgbClr r="0" g="0" b="0"/>
+      </a:fillRef>
+      <a:effectRef idx="0">
+        <a:scrgbClr r="0" g="0" b="0"/>
+      </a:effectRef>
+      <a:fontRef idx="minor"/>
+    </dgm:style>
+  </dgm:styleLbl>
+  <dgm:styleLbl name="bgAcc1">
+    <dgm:scene3d>
+      <a:camera prst="orthographicFront"/>
+      <a:lightRig rig="threePt" dir="t"/>
+    </dgm:scene3d>
+    <dgm:sp3d/>
+    <dgm:txPr/>
+    <dgm:style>
+      <a:lnRef idx="2">
+        <a:scrgbClr r="0" g="0" b="0"/>
+      </a:lnRef>
+      <a:fillRef idx="1">
+        <a:scrgbClr r="0" g="0" b="0"/>
+      </a:fillRef>
+      <a:effectRef idx="0">
+        <a:scrgbClr r="0" g="0" b="0"/>
+      </a:effectRef>
+      <a:fontRef idx="minor"/>
+    </dgm:style>
+  </dgm:styleLbl>
+  <dgm:styleLbl name="solidFgAcc1">
+    <dgm:scene3d>
+      <a:camera prst="orthographicFront"/>
+      <a:lightRig rig="threePt" dir="t"/>
+    </dgm:scene3d>
+    <dgm:sp3d/>
+    <dgm:txPr/>
+    <dgm:style>
+      <a:lnRef idx="2">
+        <a:scrgbClr r="0" g="0" b="0"/>
+      </a:lnRef>
+      <a:fillRef idx="1">
+        <a:scrgbClr r="0" g="0" b="0"/>
+      </a:fillRef>
+      <a:effectRef idx="0">
+        <a:scrgbClr r="0" g="0" b="0"/>
+      </a:effectRef>
+      <a:fontRef idx="minor"/>
+    </dgm:style>
+  </dgm:styleLbl>
+  <dgm:styleLbl name="solidAlignAcc1">
+    <dgm:scene3d>
+      <a:camera prst="orthographicFront"/>
+      <a:lightRig rig="threePt" dir="t"/>
+    </dgm:scene3d>
+    <dgm:sp3d/>
+    <dgm:txPr/>
+    <dgm:style>
+      <a:lnRef idx="2">
+        <a:scrgbClr r="0" g="0" b="0"/>
+      </a:lnRef>
+      <a:fillRef idx="1">
+        <a:scrgbClr r="0" g="0" b="0"/>
+      </a:fillRef>
+      <a:effectRef idx="0">
+        <a:scrgbClr r="0" g="0" b="0"/>
+      </a:effectRef>
+      <a:fontRef idx="minor"/>
+    </dgm:style>
+  </dgm:styleLbl>
+  <dgm:styleLbl name="solidBgAcc1">
+    <dgm:scene3d>
+      <a:camera prst="orthographicFront"/>
+      <a:lightRig rig="threePt" dir="t"/>
+    </dgm:scene3d>
+    <dgm:sp3d/>
+    <dgm:txPr/>
+    <dgm:style>
+      <a:lnRef idx="2">
+        <a:scrgbClr r="0" g="0" b="0"/>
+      </a:lnRef>
+      <a:fillRef idx="1">
+        <a:scrgbClr r="0" g="0" b="0"/>
+      </a:fillRef>
+      <a:effectRef idx="0">
+        <a:scrgbClr r="0" g="0" b="0"/>
+      </a:effectRef>
+      <a:fontRef idx="minor"/>
+    </dgm:style>
+  </dgm:styleLbl>
+  <dgm:styleLbl name="fgAccFollowNode1">
+    <dgm:scene3d>
+      <a:camera prst="orthographicFront"/>
+      <a:lightRig rig="threePt" dir="t"/>
+    </dgm:scene3d>
+    <dgm:sp3d/>
+    <dgm:txPr/>
+    <dgm:style>
+      <a:lnRef idx="2">
+        <a:scrgbClr r="0" g="0" b="0"/>
+      </a:lnRef>
+      <a:fillRef idx="1">
+        <a:scrgbClr r="0" g="0" b="0"/>
+      </a:fillRef>
+      <a:effectRef idx="0">
+        <a:scrgbClr r="0" g="0" b="0"/>
+      </a:effectRef>
+      <a:fontRef idx="minor"/>
+    </dgm:style>
+  </dgm:styleLbl>
+  <dgm:styleLbl name="alignAccFollowNode1">
+    <dgm:scene3d>
+      <a:camera prst="orthographicFront"/>
+      <a:lightRig rig="threePt" dir="t"/>
+    </dgm:scene3d>
+    <dgm:sp3d/>
+    <dgm:txPr/>
+    <dgm:style>
+      <a:lnRef idx="2">
+        <a:scrgbClr r="0" g="0" b="0"/>
+      </a:lnRef>
+      <a:fillRef idx="1">
+        <a:scrgbClr r="0" g="0" b="0"/>
+      </a:fillRef>
+      <a:effectRef idx="0">
+        <a:scrgbClr r="0" g="0" b="0"/>
+      </a:effectRef>
+      <a:fontRef idx="minor"/>
+    </dgm:style>
+  </dgm:styleLbl>
+  <dgm:styleLbl name="bgAccFollowNode1">
+    <dgm:scene3d>
+      <a:camera prst="orthographicFront"/>
+      <a:lightRig rig="threePt" dir="t"/>
+    </dgm:scene3d>
+    <dgm:sp3d/>
+    <dgm:txPr/>
+    <dgm:style>
+      <a:lnRef idx="2">
+        <a:scrgbClr r="0" g="0" b="0"/>
+      </a:lnRef>
+      <a:fillRef idx="1">
+        <a:scrgbClr r="0" g="0" b="0"/>
+      </a:fillRef>
+      <a:effectRef idx="0">
+        <a:scrgbClr r="0" g="0" b="0"/>
+      </a:effectRef>
+      <a:fontRef idx="minor"/>
+    </dgm:style>
+  </dgm:styleLbl>
+  <dgm:styleLbl name="fgAcc0">
+    <dgm:scene3d>
+      <a:camera prst="orthographicFront"/>
+      <a:lightRig rig="threePt" dir="t"/>
+    </dgm:scene3d>
+    <dgm:sp3d/>
+    <dgm:txPr/>
+    <dgm:style>
+      <a:lnRef idx="2">
+        <a:scrgbClr r="0" g="0" b="0"/>
+      </a:lnRef>
+      <a:fillRef idx="1">
+        <a:scrgbClr r="0" g="0" b="0"/>
+      </a:fillRef>
+      <a:effectRef idx="0">
+        <a:scrgbClr r="0" g="0" b="0"/>
+      </a:effectRef>
+      <a:fontRef idx="minor"/>
+    </dgm:style>
+  </dgm:styleLbl>
+  <dgm:styleLbl name="fgAcc2">
+    <dgm:scene3d>
+      <a:camera prst="orthographicFront"/>
+      <a:lightRig rig="threePt" dir="t"/>
+    </dgm:scene3d>
+    <dgm:sp3d/>
+    <dgm:txPr/>
+    <dgm:style>
+      <a:lnRef idx="2">
+        <a:scrgbClr r="0" g="0" b="0"/>
+      </a:lnRef>
+      <a:fillRef idx="1">
+        <a:scrgbClr r="0" g="0" b="0"/>
+      </a:fillRef>
+      <a:effectRef idx="0">
+        <a:scrgbClr r="0" g="0" b="0"/>
+      </a:effectRef>
+      <a:fontRef idx="minor"/>
+    </dgm:style>
+  </dgm:styleLbl>
+  <dgm:styleLbl name="fgAcc3">
+    <dgm:scene3d>
+      <a:camera prst="orthographicFront"/>
+      <a:lightRig rig="threePt" dir="t"/>
+    </dgm:scene3d>
+    <dgm:sp3d/>
+    <dgm:txPr/>
+    <dgm:style>
+      <a:lnRef idx="2">
+        <a:scrgbClr r="0" g="0" b="0"/>
+      </a:lnRef>
+      <a:fillRef idx="1">
+        <a:scrgbClr r="0" g="0" b="0"/>
+      </a:fillRef>
+      <a:effectRef idx="0">
+        <a:scrgbClr r="0" g="0" b="0"/>
+      </a:effectRef>
+      <a:fontRef idx="minor"/>
+    </dgm:style>
+  </dgm:styleLbl>
+  <dgm:styleLbl name="fgAcc4">
+    <dgm:scene3d>
+      <a:camera prst="orthographicFront"/>
+      <a:lightRig rig="threePt" dir="t"/>
+    </dgm:scene3d>
+    <dgm:sp3d/>
+    <dgm:txPr/>
+    <dgm:style>
+      <a:lnRef idx="2">
+        <a:scrgbClr r="0" g="0" b="0"/>
+      </a:lnRef>
+      <a:fillRef idx="1">
+        <a:scrgbClr r="0" g="0" b="0"/>
+      </a:fillRef>
+      <a:effectRef idx="0">
+        <a:scrgbClr r="0" g="0" b="0"/>
+      </a:effectRef>
+      <a:fontRef idx="minor"/>
+    </dgm:style>
+  </dgm:styleLbl>
+  <dgm:styleLbl name="bgShp">
+    <dgm:scene3d>
+      <a:camera prst="orthographicFront"/>
+      <a:lightRig rig="threePt" dir="t"/>
+    </dgm:scene3d>
+    <dgm:sp3d/>
+    <dgm:txPr/>
+    <dgm:style>
+      <a:lnRef idx="0">
+        <a:scrgbClr r="0" g="0" b="0"/>
+      </a:lnRef>
+      <a:fillRef idx="1">
+        <a:scrgbClr r="0" g="0" b="0"/>
+      </a:fillRef>
+      <a:effectRef idx="0">
+        <a:scrgbClr r="0" g="0" b="0"/>
+      </a:effectRef>
+      <a:fontRef idx="minor"/>
+    </dgm:style>
+  </dgm:styleLbl>
+  <dgm:styleLbl name="dkBgShp">
+    <dgm:scene3d>
+      <a:camera prst="orthographicFront"/>
+      <a:lightRig rig="threePt" dir="t"/>
+    </dgm:scene3d>
+    <dgm:sp3d/>
+    <dgm:txPr/>
+    <dgm:style>
+      <a:lnRef idx="0">
+        <a:scrgbClr r="0" g="0" b="0"/>
+      </a:lnRef>
+      <a:fillRef idx="1">
+        <a:scrgbClr r="0" g="0" b="0"/>
+      </a:fillRef>
+      <a:effectRef idx="0">
+        <a:scrgbClr r="0" g="0" b="0"/>
+      </a:effectRef>
+      <a:fontRef idx="minor"/>
+    </dgm:style>
+  </dgm:styleLbl>
+  <dgm:styleLbl name="trBgShp">
+    <dgm:scene3d>
+      <a:camera prst="orthographicFront"/>
+      <a:lightRig rig="threePt" dir="t"/>
+    </dgm:scene3d>
+    <dgm:sp3d/>
+    <dgm:txPr/>
+    <dgm:style>
+      <a:lnRef idx="0">
+        <a:scrgbClr r="0" g="0" b="0"/>
+      </a:lnRef>
+      <a:fillRef idx="1">
+        <a:scrgbClr r="0" g="0" b="0"/>
+      </a:fillRef>
+      <a:effectRef idx="0">
+        <a:scrgbClr r="0" g="0" b="0"/>
+      </a:effectRef>
+      <a:fontRef idx="minor"/>
+    </dgm:style>
+  </dgm:styleLbl>
+  <dgm:styleLbl name="fgShp">
+    <dgm:scene3d>
+      <a:camera prst="orthographicFront"/>
+      <a:lightRig rig="threePt" dir="t"/>
+    </dgm:scene3d>
+    <dgm:sp3d/>
+    <dgm:txPr/>
+    <dgm:style>
+      <a:lnRef idx="2">
+        <a:scrgbClr r="0" g="0" b="0"/>
+      </a:lnRef>
+      <a:fillRef idx="1">
+        <a:scrgbClr r="0" g="0" b="0"/>
+      </a:fillRef>
+      <a:effectRef idx="0">
+        <a:scrgbClr r="0" g="0" b="0"/>
+      </a:effectRef>
+      <a:fontRef idx="minor"/>
+    </dgm:style>
+  </dgm:styleLbl>
+  <dgm:styleLbl name="revTx">
+    <dgm:scene3d>
+      <a:camera prst="orthographicFront"/>
+      <a:lightRig rig="threePt" dir="t"/>
+    </dgm:scene3d>
+    <dgm:sp3d/>
+    <dgm:txPr/>
+    <dgm:style>
+      <a:lnRef idx="0">
+        <a:scrgbClr r="0" g="0" b="0"/>
+      </a:lnRef>
+      <a:fillRef idx="0">
+        <a:scrgbClr r="0" g="0" b="0"/>
+      </a:fillRef>
+      <a:effectRef idx="0">
+        <a:scrgbClr r="0" g="0" b="0"/>
+      </a:effectRef>
+      <a:fontRef idx="minor"/>
+    </dgm:style>
+  </dgm:styleLbl>
+</dgm:styleDef>
+</file>
+
+<file path=ppt/diagrams/quickStyle2.xml><?xml version="1.0" encoding="utf-8"?>
 <dgm:styleDef xmlns:dgm="http://schemas.openxmlformats.org/drawingml/2006/diagram" xmlns:a="http://schemas.openxmlformats.org/drawingml/2006/main" uniqueId="urn:microsoft.com/office/officeart/2005/8/quickstyle/simple1">
   <dgm:title val=""/>
   <dgm:desc val=""/>
@@ -2684,7 +4802,7 @@
             <a:fld id="{7D0065BE-0657-4A47-90AD-C21C55E16B19}" type="datetime4">
               <a:rPr lang="en-US" smtClean="0"/>
               <a:pPr/>
-              <a:t>July 27, 2016</a:t>
+              <a:t>July 28, 2016</a:t>
             </a:fld>
             <a:endParaRPr lang="en-US"/>
           </a:p>
@@ -2851,7 +4969,7 @@
             <a:fld id="{A16C3AA4-67BE-44F7-809A-3582401494AF}" type="datetime4">
               <a:rPr lang="en-US" smtClean="0"/>
               <a:pPr/>
-              <a:t>July 27, 2016</a:t>
+              <a:t>July 28, 2016</a:t>
             </a:fld>
             <a:endParaRPr lang="en-US"/>
           </a:p>
@@ -3028,7 +5146,7 @@
             <a:fld id="{25172EEB-1769-4776-AD69-E7C1260563EB}" type="datetime4">
               <a:rPr lang="en-US" smtClean="0"/>
               <a:pPr/>
-              <a:t>July 27, 2016</a:t>
+              <a:t>July 28, 2016</a:t>
             </a:fld>
             <a:endParaRPr lang="en-US"/>
           </a:p>
@@ -3195,7 +5313,7 @@
             <a:fld id="{D47BB8AF-C16A-4836-A92D-61834B5F0BA5}" type="datetime4">
               <a:rPr lang="en-US" smtClean="0"/>
               <a:pPr/>
-              <a:t>July 27, 2016</a:t>
+              <a:t>July 28, 2016</a:t>
             </a:fld>
             <a:endParaRPr lang="en-US"/>
           </a:p>
@@ -3750,7 +5868,7 @@
             <a:fld id="{647D2193-4505-4A75-99BB-880C6989A757}" type="datetime4">
               <a:rPr lang="en-US" smtClean="0"/>
               <a:pPr/>
-              <a:t>July 27, 2016</a:t>
+              <a:t>July 28, 2016</a:t>
             </a:fld>
             <a:endParaRPr lang="en-US"/>
           </a:p>
@@ -4012,7 +6130,7 @@
             <a:fld id="{113A18F4-33C3-445B-924C-31108C51719C}" type="datetime4">
               <a:rPr lang="en-US" smtClean="0"/>
               <a:pPr/>
-              <a:t>July 27, 2016</a:t>
+              <a:t>July 28, 2016</a:t>
             </a:fld>
             <a:endParaRPr lang="en-US"/>
           </a:p>
@@ -4502,7 +6620,7 @@
             <a:fld id="{3AF7543A-E259-478F-9E0D-57BA40E442B7}" type="datetime4">
               <a:rPr lang="en-US" smtClean="0"/>
               <a:pPr/>
-              <a:t>July 27, 2016</a:t>
+              <a:t>July 28, 2016</a:t>
             </a:fld>
             <a:endParaRPr lang="en-US"/>
           </a:p>
@@ -4617,7 +6735,7 @@
             <a:fld id="{1EFB012D-77A1-44B0-BB26-329BA1EE55C9}" type="datetime4">
               <a:rPr lang="en-US" smtClean="0"/>
               <a:pPr/>
-              <a:t>July 27, 2016</a:t>
+              <a:t>July 28, 2016</a:t>
             </a:fld>
             <a:endParaRPr lang="en-US"/>
           </a:p>
@@ -4709,7 +6827,7 @@
             <a:fld id="{94B7499E-3031-413E-B01E-B94970708CAA}" type="datetime4">
               <a:rPr lang="en-US" smtClean="0"/>
               <a:pPr/>
-              <a:t>July 27, 2016</a:t>
+              <a:t>July 28, 2016</a:t>
             </a:fld>
             <a:endParaRPr lang="en-US"/>
           </a:p>
@@ -5141,7 +7259,7 @@
             <a:fld id="{DC7EAB0C-2220-4D0E-A0DD-DB7FA0F742F4}" type="datetime4">
               <a:rPr lang="en-US" smtClean="0"/>
               <a:pPr/>
-              <a:t>July 27, 2016</a:t>
+              <a:t>July 28, 2016</a:t>
             </a:fld>
             <a:endParaRPr lang="en-US"/>
           </a:p>
@@ -5672,7 +7790,7 @@
             <a:fld id="{E3416D63-31BF-4B94-B6C5-E20B2C63F515}" type="datetime4">
               <a:rPr lang="en-US" smtClean="0"/>
               <a:pPr/>
-              <a:t>July 27, 2016</a:t>
+              <a:t>July 28, 2016</a:t>
             </a:fld>
             <a:endParaRPr lang="en-US"/>
           </a:p>
@@ -6514,7 +8632,7 @@
             <a:fld id="{62B1B13E-D5AF-485E-81A1-82A140076526}" type="datetime4">
               <a:rPr lang="en-US" smtClean="0"/>
               <a:pPr/>
-              <a:t>July 27, 2016</a:t>
+              <a:t>July 28, 2016</a:t>
             </a:fld>
             <a:endParaRPr lang="en-US" dirty="0"/>
           </a:p>
@@ -7023,6 +9141,13 @@
   <p:clrMapOvr>
     <a:masterClrMapping/>
   </p:clrMapOvr>
+  <p:timing>
+    <p:tnLst>
+      <p:par>
+        <p:cTn xmlns:p14="http://schemas.microsoft.com/office/powerpoint/2010/main" id="1" dur="indefinite" restart="never" nodeType="tmRoot"/>
+      </p:par>
+    </p:tnLst>
+  </p:timing>
 </p:sld>
 </file>
 
@@ -7173,6 +9298,13 @@
   <p:clrMapOvr>
     <a:masterClrMapping/>
   </p:clrMapOvr>
+  <p:timing>
+    <p:tnLst>
+      <p:par>
+        <p:cTn xmlns:p14="http://schemas.microsoft.com/office/powerpoint/2010/main" id="1" dur="indefinite" restart="never" nodeType="tmRoot"/>
+      </p:par>
+    </p:tnLst>
+  </p:timing>
 </p:sld>
 </file>
 
@@ -7239,148 +9371,190 @@
           <a:lstStyle/>
           <a:p>
             <a:r>
+              <a:rPr lang="en-US" sz="1500" dirty="0" smtClean="0">
+                <a:solidFill>
+                  <a:schemeClr val="accent2">
+                    <a:lumMod val="75000"/>
+                  </a:schemeClr>
+                </a:solidFill>
+              </a:rPr>
+              <a:t>Healer</a:t>
+            </a:r>
+          </a:p>
+          <a:p>
+            <a:r>
               <a:rPr lang="en-US" sz="1500" b="0" dirty="0" smtClean="0"/>
-              <a:t>Healer</a:t>
-            </a:r>
-          </a:p>
-          <a:p>
-            <a:r>
-              <a:rPr lang="en-US" sz="1500" dirty="0" smtClean="0"/>
               <a:t>	Separate spec for behavior</a:t>
             </a:r>
           </a:p>
           <a:p>
             <a:r>
-              <a:rPr lang="en-US" sz="1500" dirty="0"/>
+              <a:rPr lang="en-US" sz="1500" b="0" dirty="0"/>
               <a:t>	</a:t>
             </a:r>
             <a:r>
-              <a:rPr lang="en-US" sz="1500" dirty="0" smtClean="0"/>
+              <a:rPr lang="en-US" sz="1500" b="0" dirty="0" smtClean="0"/>
               <a:t>On Bark: head to Hero to heal</a:t>
             </a:r>
           </a:p>
           <a:p>
             <a:r>
-              <a:rPr lang="en-US" sz="1500" dirty="0"/>
+              <a:rPr lang="en-US" sz="1500" b="0" dirty="0"/>
               <a:t>	</a:t>
             </a:r>
             <a:r>
-              <a:rPr lang="en-US" sz="1500" dirty="0" smtClean="0"/>
+              <a:rPr lang="en-US" sz="1500" b="0" dirty="0" smtClean="0"/>
               <a:t>Default: passively find/heal Companions</a:t>
             </a:r>
           </a:p>
           <a:p>
             <a:r>
-              <a:rPr lang="en-US" sz="1500" dirty="0"/>
+              <a:rPr lang="en-US" sz="1500" b="0" dirty="0"/>
               <a:t>	</a:t>
             </a:r>
             <a:r>
-              <a:rPr lang="en-US" sz="1500" dirty="0" smtClean="0"/>
+              <a:rPr lang="en-US" sz="1500" b="0" dirty="0" smtClean="0"/>
               <a:t>Formation</a:t>
             </a:r>
-            <a:endParaRPr lang="en-US" sz="1500" dirty="0"/>
-          </a:p>
-          <a:p>
-            <a:r>
-              <a:rPr lang="en-US" sz="1500" dirty="0" smtClean="0"/>
-              <a:t>Player </a:t>
-            </a:r>
+            <a:endParaRPr lang="en-US" sz="1500" b="0" dirty="0"/>
+          </a:p>
+          <a:p>
+            <a:r>
+              <a:rPr lang="en-US" sz="1500" dirty="0" smtClean="0">
+                <a:solidFill>
+                  <a:schemeClr val="accent3">
+                    <a:lumMod val="75000"/>
+                  </a:schemeClr>
+                </a:solidFill>
+              </a:rPr>
+              <a:t>Player Navigation</a:t>
+            </a:r>
+          </a:p>
+          <a:p>
             <a:r>
               <a:rPr lang="en-US" sz="1500" b="0" dirty="0" smtClean="0"/>
-              <a:t>Navigation</a:t>
-            </a:r>
-          </a:p>
-          <a:p>
-            <a:r>
-              <a:rPr lang="en-US" sz="1500" dirty="0" smtClean="0"/>
               <a:t>	WASD</a:t>
             </a:r>
           </a:p>
           <a:p>
             <a:r>
-              <a:rPr lang="en-US" sz="1500" dirty="0"/>
+              <a:rPr lang="en-US" sz="1500" b="0" dirty="0"/>
               <a:t>	</a:t>
             </a:r>
             <a:r>
-              <a:rPr lang="en-US" sz="1500" dirty="0" smtClean="0"/>
-              <a:t>Shoot in direction of curser</a:t>
-            </a:r>
-            <a:endParaRPr lang="en-US" sz="1500" dirty="0"/>
-          </a:p>
-          <a:p>
-            <a:r>
-              <a:rPr lang="en-US" sz="1500" dirty="0" smtClean="0"/>
-              <a:t>Dynamic Formations</a:t>
-            </a:r>
-          </a:p>
-          <a:p>
-            <a:r>
-              <a:rPr lang="en-US" sz="1500" dirty="0" smtClean="0"/>
+              <a:rPr lang="en-US" sz="1500" b="0" dirty="0" smtClean="0"/>
+              <a:t>Shoot in direction of </a:t>
+            </a:r>
+            <a:r>
+              <a:rPr lang="en-US" sz="1500" b="0" dirty="0" smtClean="0"/>
+              <a:t>cursor</a:t>
+            </a:r>
+            <a:endParaRPr lang="en-US" sz="1500" b="0" dirty="0"/>
+          </a:p>
+          <a:p>
+            <a:r>
+              <a:rPr lang="en-US" sz="1500" dirty="0">
+                <a:solidFill>
+                  <a:schemeClr val="accent3">
+                    <a:lumMod val="75000"/>
+                  </a:schemeClr>
+                </a:solidFill>
+              </a:rPr>
+              <a:t>Effective Companion AI</a:t>
+            </a:r>
+          </a:p>
+          <a:p>
+            <a:r>
+              <a:rPr lang="en-US" sz="1500" b="0" dirty="0"/>
+              <a:t>      Behavior trees</a:t>
+            </a:r>
+          </a:p>
+          <a:p>
+            <a:r>
+              <a:rPr lang="en-US" sz="1500" b="0" dirty="0"/>
+              <a:t>      Cover system  </a:t>
+            </a:r>
+            <a:endParaRPr lang="en-US" sz="1500" b="0" dirty="0" smtClean="0"/>
+          </a:p>
+          <a:p>
+            <a:endParaRPr lang="en-US" sz="1500" b="0" dirty="0"/>
+          </a:p>
+          <a:p>
+            <a:r>
+              <a:rPr lang="en-US" sz="1500" dirty="0" smtClean="0">
+                <a:solidFill>
+                  <a:schemeClr val="accent6">
+                    <a:lumMod val="75000"/>
+                  </a:schemeClr>
+                </a:solidFill>
+              </a:rPr>
+              <a:t>Dynamic </a:t>
+            </a:r>
+            <a:r>
+              <a:rPr lang="en-US" sz="1500" dirty="0" smtClean="0">
+                <a:solidFill>
+                  <a:schemeClr val="accent6">
+                    <a:lumMod val="75000"/>
+                  </a:schemeClr>
+                </a:solidFill>
+              </a:rPr>
+              <a:t>Formations</a:t>
+            </a:r>
+          </a:p>
+          <a:p>
+            <a:r>
+              <a:rPr lang="en-US" sz="1500" b="0" dirty="0" smtClean="0"/>
               <a:t>	Triangle shaped formation relative to player position</a:t>
             </a:r>
           </a:p>
           <a:p>
             <a:r>
-              <a:rPr lang="en-US" sz="1500" dirty="0"/>
+              <a:rPr lang="en-US" sz="1500" b="0" dirty="0"/>
               <a:t>	</a:t>
             </a:r>
             <a:r>
-              <a:rPr lang="en-US" sz="1500" dirty="0" smtClean="0"/>
+              <a:rPr lang="en-US" sz="1500" b="0" dirty="0" smtClean="0"/>
               <a:t>Area-of-effect attacks</a:t>
             </a:r>
           </a:p>
           <a:p>
             <a:r>
-              <a:rPr lang="en-US" sz="1500" dirty="0" smtClean="0"/>
-              <a:t>Effective Companion AI</a:t>
-            </a:r>
-          </a:p>
-          <a:p>
-            <a:r>
-              <a:rPr lang="en-US" sz="1500" dirty="0"/>
+              <a:rPr lang="en-US" sz="1500" dirty="0" smtClean="0">
+                <a:solidFill>
+                  <a:srgbClr val="CF6868"/>
+                </a:solidFill>
+              </a:rPr>
+              <a:t>Contextual </a:t>
+            </a:r>
+            <a:r>
+              <a:rPr lang="en-US" sz="1500" dirty="0" smtClean="0">
+                <a:solidFill>
+                  <a:srgbClr val="CF6868"/>
+                </a:solidFill>
+              </a:rPr>
+              <a:t>Companion Interaction</a:t>
+            </a:r>
+          </a:p>
+          <a:p>
+            <a:r>
+              <a:rPr lang="en-US" sz="1500" b="0" dirty="0"/>
               <a:t> </a:t>
             </a:r>
             <a:r>
-              <a:rPr lang="en-US" sz="1500" dirty="0" smtClean="0"/>
-              <a:t>     Behavior trees</a:t>
-            </a:r>
-          </a:p>
-          <a:p>
-            <a:r>
-              <a:rPr lang="en-US" sz="1500" dirty="0"/>
+              <a:rPr lang="en-US" sz="1500" b="0" dirty="0" smtClean="0"/>
+              <a:t>     E key for barking</a:t>
+            </a:r>
+          </a:p>
+          <a:p>
+            <a:r>
+              <a:rPr lang="en-US" sz="1500" b="0" dirty="0"/>
               <a:t> </a:t>
             </a:r>
             <a:r>
-              <a:rPr lang="en-US" sz="1500" dirty="0" smtClean="0"/>
-              <a:t>     Cover system  </a:t>
-            </a:r>
-          </a:p>
-          <a:p>
-            <a:r>
-              <a:rPr lang="en-US" sz="1500" dirty="0" smtClean="0"/>
-              <a:t>Contextual Companion Interaction</a:t>
-            </a:r>
-          </a:p>
-          <a:p>
-            <a:r>
-              <a:rPr lang="en-US" sz="1500" dirty="0"/>
-              <a:t> </a:t>
-            </a:r>
-            <a:r>
-              <a:rPr lang="en-US" sz="1500" dirty="0" smtClean="0"/>
-              <a:t>     E key for barking</a:t>
-            </a:r>
-          </a:p>
-          <a:p>
-            <a:r>
-              <a:rPr lang="en-US" sz="1500" dirty="0"/>
-              <a:t> </a:t>
-            </a:r>
-            <a:r>
-              <a:rPr lang="en-US" sz="1500" dirty="0" smtClean="0"/>
+              <a:rPr lang="en-US" sz="1500" b="0" dirty="0" smtClean="0"/>
               <a:t>    Context of situation fed into metrics to be evaluated by spec tree</a:t>
             </a:r>
-            <a:endParaRPr lang="en-US" sz="1500" dirty="0"/>
+            <a:endParaRPr lang="en-US" sz="1500" b="0" dirty="0"/>
           </a:p>
         </p:txBody>
       </p:sp>
@@ -7394,6 +9568,13 @@
   <p:clrMapOvr>
     <a:masterClrMapping/>
   </p:clrMapOvr>
+  <p:timing>
+    <p:tnLst>
+      <p:par>
+        <p:cTn xmlns:p14="http://schemas.microsoft.com/office/powerpoint/2010/main" id="1" dur="indefinite" restart="never" nodeType="tmRoot"/>
+      </p:par>
+    </p:tnLst>
+  </p:timing>
 </p:sld>
 </file>
 
@@ -7466,6 +9647,13 @@
   <p:clrMapOvr>
     <a:masterClrMapping/>
   </p:clrMapOvr>
+  <p:timing>
+    <p:tnLst>
+      <p:par>
+        <p:cTn xmlns:p14="http://schemas.microsoft.com/office/powerpoint/2010/main" id="1" dur="indefinite" restart="never" nodeType="tmRoot"/>
+      </p:par>
+    </p:tnLst>
+  </p:timing>
 </p:sld>
 </file>
 
@@ -7601,6 +9789,28 @@
           </a:p>
         </p:txBody>
       </p:sp>
+      <p:graphicFrame>
+        <p:nvGraphicFramePr>
+          <p:cNvPr id="5" name="Diagram 4"/>
+          <p:cNvGraphicFramePr/>
+          <p:nvPr>
+            <p:extLst>
+              <p:ext uri="{D42A27DB-BD31-4B8C-83A1-F6EECF244321}">
+                <p14:modId xmlns:p14="http://schemas.microsoft.com/office/powerpoint/2010/main" val="3676056853"/>
+              </p:ext>
+            </p:extLst>
+          </p:nvPr>
+        </p:nvGraphicFramePr>
+        <p:xfrm>
+          <a:off x="1166496" y="3490198"/>
+          <a:ext cx="6486225" cy="1306013"/>
+        </p:xfrm>
+        <a:graphic>
+          <a:graphicData uri="http://schemas.openxmlformats.org/drawingml/2006/diagram">
+            <dgm:relIds xmlns:dgm="http://schemas.openxmlformats.org/drawingml/2006/diagram" xmlns:r="http://schemas.openxmlformats.org/officeDocument/2006/relationships" r:dm="rId2" r:lo="rId3" r:qs="rId4" r:cs="rId5"/>
+          </a:graphicData>
+        </a:graphic>
+      </p:graphicFrame>
     </p:spTree>
     <p:extLst>
       <p:ext uri="{BB962C8B-B14F-4D97-AF65-F5344CB8AC3E}">

</xml_diff>